<commit_message>
list of figures and tables added, couple typos corrected
</commit_message>
<xml_diff>
--- a/report/Presentation.pptx
+++ b/report/Presentation.pptx
@@ -4,18 +4,20 @@
   <p:sldMasterIdLst>
     <p:sldMasterId id="2147483660" r:id="rId1"/>
   </p:sldMasterIdLst>
+  <p:notesMasterIdLst>
+    <p:notesMasterId r:id="rId12"/>
+  </p:notesMasterIdLst>
   <p:sldIdLst>
     <p:sldId id="257" r:id="rId2"/>
-    <p:sldId id="266" r:id="rId3"/>
-    <p:sldId id="258" r:id="rId4"/>
-    <p:sldId id="265" r:id="rId5"/>
-    <p:sldId id="259" r:id="rId6"/>
-    <p:sldId id="260" r:id="rId7"/>
-    <p:sldId id="261" r:id="rId8"/>
-    <p:sldId id="262" r:id="rId9"/>
-    <p:sldId id="256" r:id="rId10"/>
-    <p:sldId id="264" r:id="rId11"/>
-    <p:sldId id="263" r:id="rId12"/>
+    <p:sldId id="258" r:id="rId3"/>
+    <p:sldId id="265" r:id="rId4"/>
+    <p:sldId id="259" r:id="rId5"/>
+    <p:sldId id="260" r:id="rId6"/>
+    <p:sldId id="261" r:id="rId7"/>
+    <p:sldId id="262" r:id="rId8"/>
+    <p:sldId id="256" r:id="rId9"/>
+    <p:sldId id="264" r:id="rId10"/>
+    <p:sldId id="263" r:id="rId11"/>
   </p:sldIdLst>
   <p:sldSz cx="12192000" cy="6858000"/>
   <p:notesSz cx="6858000" cy="9144000"/>
@@ -2164,7 +2166,7 @@
   <dgm:whole/>
   <dgm:extLst>
     <a:ext uri="http://schemas.microsoft.com/office/drawing/2008/diagram">
-      <dsp:dataModelExt xmlns:dsp="http://schemas.microsoft.com/office/drawing/2008/diagram" relId="rId6" minVer="http://schemas.openxmlformats.org/drawingml/2006/diagram"/>
+      <dsp:dataModelExt xmlns:dsp="http://schemas.microsoft.com/office/drawing/2008/diagram" relId="rId7" minVer="http://schemas.openxmlformats.org/drawingml/2006/diagram"/>
     </a:ext>
   </dgm:extLst>
 </dgm:dataModel>
@@ -5818,6 +5820,439 @@
 </dgm:styleDef>
 </file>
 
+<file path=ppt/notesMasters/notesMaster1.xml><?xml version="1.0" encoding="utf-8"?>
+<p:notesMaster xmlns:a="http://schemas.openxmlformats.org/drawingml/2006/main" xmlns:r="http://schemas.openxmlformats.org/officeDocument/2006/relationships" xmlns:p="http://schemas.openxmlformats.org/presentationml/2006/main">
+  <p:cSld>
+    <p:bg>
+      <p:bgRef idx="1001">
+        <a:schemeClr val="bg1"/>
+      </p:bgRef>
+    </p:bg>
+    <p:spTree>
+      <p:nvGrpSpPr>
+        <p:cNvPr id="1" name=""/>
+        <p:cNvGrpSpPr/>
+        <p:nvPr/>
+      </p:nvGrpSpPr>
+      <p:grpSpPr>
+        <a:xfrm>
+          <a:off x="0" y="0"/>
+          <a:ext cx="0" cy="0"/>
+          <a:chOff x="0" y="0"/>
+          <a:chExt cx="0" cy="0"/>
+        </a:xfrm>
+      </p:grpSpPr>
+      <p:sp>
+        <p:nvSpPr>
+          <p:cNvPr id="2" name="Header Placeholder 1"/>
+          <p:cNvSpPr>
+            <a:spLocks noGrp="1"/>
+          </p:cNvSpPr>
+          <p:nvPr>
+            <p:ph type="hdr" sz="quarter"/>
+          </p:nvPr>
+        </p:nvSpPr>
+        <p:spPr>
+          <a:xfrm>
+            <a:off x="0" y="0"/>
+            <a:ext cx="2971800" cy="458788"/>
+          </a:xfrm>
+          <a:prstGeom prst="rect">
+            <a:avLst/>
+          </a:prstGeom>
+        </p:spPr>
+        <p:txBody>
+          <a:bodyPr vert="horz" lIns="91440" tIns="45720" rIns="91440" bIns="45720" rtlCol="0"/>
+          <a:lstStyle>
+            <a:lvl1pPr algn="l">
+              <a:defRPr sz="1200"/>
+            </a:lvl1pPr>
+          </a:lstStyle>
+          <a:p>
+            <a:endParaRPr lang="en-US"/>
+          </a:p>
+        </p:txBody>
+      </p:sp>
+      <p:sp>
+        <p:nvSpPr>
+          <p:cNvPr id="3" name="Date Placeholder 2"/>
+          <p:cNvSpPr>
+            <a:spLocks noGrp="1"/>
+          </p:cNvSpPr>
+          <p:nvPr>
+            <p:ph type="dt" idx="1"/>
+          </p:nvPr>
+        </p:nvSpPr>
+        <p:spPr>
+          <a:xfrm>
+            <a:off x="3884613" y="0"/>
+            <a:ext cx="2971800" cy="458788"/>
+          </a:xfrm>
+          <a:prstGeom prst="rect">
+            <a:avLst/>
+          </a:prstGeom>
+        </p:spPr>
+        <p:txBody>
+          <a:bodyPr vert="horz" lIns="91440" tIns="45720" rIns="91440" bIns="45720" rtlCol="0"/>
+          <a:lstStyle>
+            <a:lvl1pPr algn="r">
+              <a:defRPr sz="1200"/>
+            </a:lvl1pPr>
+          </a:lstStyle>
+          <a:p>
+            <a:fld id="{B31F1B2C-F3E6-4771-AB0F-F956F250AE5E}" type="datetimeFigureOut">
+              <a:rPr lang="en-US" smtClean="0"/>
+              <a:t>2/8/2022</a:t>
+            </a:fld>
+            <a:endParaRPr lang="en-US"/>
+          </a:p>
+        </p:txBody>
+      </p:sp>
+      <p:sp>
+        <p:nvSpPr>
+          <p:cNvPr id="4" name="Slide Image Placeholder 3"/>
+          <p:cNvSpPr>
+            <a:spLocks noGrp="1" noRot="1" noChangeAspect="1"/>
+          </p:cNvSpPr>
+          <p:nvPr>
+            <p:ph type="sldImg" idx="2"/>
+          </p:nvPr>
+        </p:nvSpPr>
+        <p:spPr>
+          <a:xfrm>
+            <a:off x="685800" y="1143000"/>
+            <a:ext cx="5486400" cy="3086100"/>
+          </a:xfrm>
+          <a:prstGeom prst="rect">
+            <a:avLst/>
+          </a:prstGeom>
+          <a:noFill/>
+          <a:ln w="12700">
+            <a:solidFill>
+              <a:prstClr val="black"/>
+            </a:solidFill>
+          </a:ln>
+        </p:spPr>
+        <p:txBody>
+          <a:bodyPr vert="horz" lIns="91440" tIns="45720" rIns="91440" bIns="45720" rtlCol="0" anchor="ctr"/>
+          <a:lstStyle/>
+          <a:p>
+            <a:endParaRPr lang="en-US"/>
+          </a:p>
+        </p:txBody>
+      </p:sp>
+      <p:sp>
+        <p:nvSpPr>
+          <p:cNvPr id="5" name="Notes Placeholder 4"/>
+          <p:cNvSpPr>
+            <a:spLocks noGrp="1"/>
+          </p:cNvSpPr>
+          <p:nvPr>
+            <p:ph type="body" sz="quarter" idx="3"/>
+          </p:nvPr>
+        </p:nvSpPr>
+        <p:spPr>
+          <a:xfrm>
+            <a:off x="685800" y="4400550"/>
+            <a:ext cx="5486400" cy="3600450"/>
+          </a:xfrm>
+          <a:prstGeom prst="rect">
+            <a:avLst/>
+          </a:prstGeom>
+        </p:spPr>
+        <p:txBody>
+          <a:bodyPr vert="horz" lIns="91440" tIns="45720" rIns="91440" bIns="45720" rtlCol="0"/>
+          <a:lstStyle/>
+          <a:p>
+            <a:pPr lvl="0"/>
+            <a:r>
+              <a:rPr lang="en-US"/>
+              <a:t>Click to edit Master text styles</a:t>
+            </a:r>
+          </a:p>
+          <a:p>
+            <a:pPr lvl="1"/>
+            <a:r>
+              <a:rPr lang="en-US"/>
+              <a:t>Second level</a:t>
+            </a:r>
+          </a:p>
+          <a:p>
+            <a:pPr lvl="2"/>
+            <a:r>
+              <a:rPr lang="en-US"/>
+              <a:t>Third level</a:t>
+            </a:r>
+          </a:p>
+          <a:p>
+            <a:pPr lvl="3"/>
+            <a:r>
+              <a:rPr lang="en-US"/>
+              <a:t>Fourth level</a:t>
+            </a:r>
+          </a:p>
+          <a:p>
+            <a:pPr lvl="4"/>
+            <a:r>
+              <a:rPr lang="en-US"/>
+              <a:t>Fifth level</a:t>
+            </a:r>
+          </a:p>
+        </p:txBody>
+      </p:sp>
+      <p:sp>
+        <p:nvSpPr>
+          <p:cNvPr id="6" name="Footer Placeholder 5"/>
+          <p:cNvSpPr>
+            <a:spLocks noGrp="1"/>
+          </p:cNvSpPr>
+          <p:nvPr>
+            <p:ph type="ftr" sz="quarter" idx="4"/>
+          </p:nvPr>
+        </p:nvSpPr>
+        <p:spPr>
+          <a:xfrm>
+            <a:off x="0" y="8685213"/>
+            <a:ext cx="2971800" cy="458787"/>
+          </a:xfrm>
+          <a:prstGeom prst="rect">
+            <a:avLst/>
+          </a:prstGeom>
+        </p:spPr>
+        <p:txBody>
+          <a:bodyPr vert="horz" lIns="91440" tIns="45720" rIns="91440" bIns="45720" rtlCol="0" anchor="b"/>
+          <a:lstStyle>
+            <a:lvl1pPr algn="l">
+              <a:defRPr sz="1200"/>
+            </a:lvl1pPr>
+          </a:lstStyle>
+          <a:p>
+            <a:endParaRPr lang="en-US"/>
+          </a:p>
+        </p:txBody>
+      </p:sp>
+      <p:sp>
+        <p:nvSpPr>
+          <p:cNvPr id="7" name="Slide Number Placeholder 6"/>
+          <p:cNvSpPr>
+            <a:spLocks noGrp="1"/>
+          </p:cNvSpPr>
+          <p:nvPr>
+            <p:ph type="sldNum" sz="quarter" idx="5"/>
+          </p:nvPr>
+        </p:nvSpPr>
+        <p:spPr>
+          <a:xfrm>
+            <a:off x="3884613" y="8685213"/>
+            <a:ext cx="2971800" cy="458787"/>
+          </a:xfrm>
+          <a:prstGeom prst="rect">
+            <a:avLst/>
+          </a:prstGeom>
+        </p:spPr>
+        <p:txBody>
+          <a:bodyPr vert="horz" lIns="91440" tIns="45720" rIns="91440" bIns="45720" rtlCol="0" anchor="b"/>
+          <a:lstStyle>
+            <a:lvl1pPr algn="r">
+              <a:defRPr sz="1200"/>
+            </a:lvl1pPr>
+          </a:lstStyle>
+          <a:p>
+            <a:fld id="{14AC118C-48E1-4114-9041-6A465FDC6B30}" type="slidenum">
+              <a:rPr lang="en-US" smtClean="0"/>
+              <a:t>‹#›</a:t>
+            </a:fld>
+            <a:endParaRPr lang="en-US"/>
+          </a:p>
+        </p:txBody>
+      </p:sp>
+    </p:spTree>
+    <p:extLst>
+      <p:ext uri="{BB962C8B-B14F-4D97-AF65-F5344CB8AC3E}">
+        <p14:creationId xmlns:p14="http://schemas.microsoft.com/office/powerpoint/2010/main" val="1956118085"/>
+      </p:ext>
+    </p:extLst>
+  </p:cSld>
+  <p:clrMap bg1="lt1" tx1="dk1" bg2="lt2" tx2="dk2" accent1="accent1" accent2="accent2" accent3="accent3" accent4="accent4" accent5="accent5" accent6="accent6" hlink="hlink" folHlink="folHlink"/>
+  <p:notesStyle>
+    <a:lvl1pPr marL="0" algn="l" defTabSz="914400" rtl="0" eaLnBrk="1" latinLnBrk="0" hangingPunct="1">
+      <a:defRPr sz="1200" kern="1200">
+        <a:solidFill>
+          <a:schemeClr val="tx1"/>
+        </a:solidFill>
+        <a:latin typeface="+mn-lt"/>
+        <a:ea typeface="+mn-ea"/>
+        <a:cs typeface="+mn-cs"/>
+      </a:defRPr>
+    </a:lvl1pPr>
+    <a:lvl2pPr marL="457200" algn="l" defTabSz="914400" rtl="0" eaLnBrk="1" latinLnBrk="0" hangingPunct="1">
+      <a:defRPr sz="1200" kern="1200">
+        <a:solidFill>
+          <a:schemeClr val="tx1"/>
+        </a:solidFill>
+        <a:latin typeface="+mn-lt"/>
+        <a:ea typeface="+mn-ea"/>
+        <a:cs typeface="+mn-cs"/>
+      </a:defRPr>
+    </a:lvl2pPr>
+    <a:lvl3pPr marL="914400" algn="l" defTabSz="914400" rtl="0" eaLnBrk="1" latinLnBrk="0" hangingPunct="1">
+      <a:defRPr sz="1200" kern="1200">
+        <a:solidFill>
+          <a:schemeClr val="tx1"/>
+        </a:solidFill>
+        <a:latin typeface="+mn-lt"/>
+        <a:ea typeface="+mn-ea"/>
+        <a:cs typeface="+mn-cs"/>
+      </a:defRPr>
+    </a:lvl3pPr>
+    <a:lvl4pPr marL="1371600" algn="l" defTabSz="914400" rtl="0" eaLnBrk="1" latinLnBrk="0" hangingPunct="1">
+      <a:defRPr sz="1200" kern="1200">
+        <a:solidFill>
+          <a:schemeClr val="tx1"/>
+        </a:solidFill>
+        <a:latin typeface="+mn-lt"/>
+        <a:ea typeface="+mn-ea"/>
+        <a:cs typeface="+mn-cs"/>
+      </a:defRPr>
+    </a:lvl4pPr>
+    <a:lvl5pPr marL="1828800" algn="l" defTabSz="914400" rtl="0" eaLnBrk="1" latinLnBrk="0" hangingPunct="1">
+      <a:defRPr sz="1200" kern="1200">
+        <a:solidFill>
+          <a:schemeClr val="tx1"/>
+        </a:solidFill>
+        <a:latin typeface="+mn-lt"/>
+        <a:ea typeface="+mn-ea"/>
+        <a:cs typeface="+mn-cs"/>
+      </a:defRPr>
+    </a:lvl5pPr>
+    <a:lvl6pPr marL="2286000" algn="l" defTabSz="914400" rtl="0" eaLnBrk="1" latinLnBrk="0" hangingPunct="1">
+      <a:defRPr sz="1200" kern="1200">
+        <a:solidFill>
+          <a:schemeClr val="tx1"/>
+        </a:solidFill>
+        <a:latin typeface="+mn-lt"/>
+        <a:ea typeface="+mn-ea"/>
+        <a:cs typeface="+mn-cs"/>
+      </a:defRPr>
+    </a:lvl6pPr>
+    <a:lvl7pPr marL="2743200" algn="l" defTabSz="914400" rtl="0" eaLnBrk="1" latinLnBrk="0" hangingPunct="1">
+      <a:defRPr sz="1200" kern="1200">
+        <a:solidFill>
+          <a:schemeClr val="tx1"/>
+        </a:solidFill>
+        <a:latin typeface="+mn-lt"/>
+        <a:ea typeface="+mn-ea"/>
+        <a:cs typeface="+mn-cs"/>
+      </a:defRPr>
+    </a:lvl7pPr>
+    <a:lvl8pPr marL="3200400" algn="l" defTabSz="914400" rtl="0" eaLnBrk="1" latinLnBrk="0" hangingPunct="1">
+      <a:defRPr sz="1200" kern="1200">
+        <a:solidFill>
+          <a:schemeClr val="tx1"/>
+        </a:solidFill>
+        <a:latin typeface="+mn-lt"/>
+        <a:ea typeface="+mn-ea"/>
+        <a:cs typeface="+mn-cs"/>
+      </a:defRPr>
+    </a:lvl8pPr>
+    <a:lvl9pPr marL="3657600" algn="l" defTabSz="914400" rtl="0" eaLnBrk="1" latinLnBrk="0" hangingPunct="1">
+      <a:defRPr sz="1200" kern="1200">
+        <a:solidFill>
+          <a:schemeClr val="tx1"/>
+        </a:solidFill>
+        <a:latin typeface="+mn-lt"/>
+        <a:ea typeface="+mn-ea"/>
+        <a:cs typeface="+mn-cs"/>
+      </a:defRPr>
+    </a:lvl9pPr>
+  </p:notesStyle>
+</p:notesMaster>
+</file>
+
+<file path=ppt/notesSlides/notesSlide1.xml><?xml version="1.0" encoding="utf-8"?>
+<p:notes xmlns:a="http://schemas.openxmlformats.org/drawingml/2006/main" xmlns:r="http://schemas.openxmlformats.org/officeDocument/2006/relationships" xmlns:p="http://schemas.openxmlformats.org/presentationml/2006/main">
+  <p:cSld>
+    <p:spTree>
+      <p:nvGrpSpPr>
+        <p:cNvPr id="1" name=""/>
+        <p:cNvGrpSpPr/>
+        <p:nvPr/>
+      </p:nvGrpSpPr>
+      <p:grpSpPr>
+        <a:xfrm>
+          <a:off x="0" y="0"/>
+          <a:ext cx="0" cy="0"/>
+          <a:chOff x="0" y="0"/>
+          <a:chExt cx="0" cy="0"/>
+        </a:xfrm>
+      </p:grpSpPr>
+      <p:sp>
+        <p:nvSpPr>
+          <p:cNvPr id="2" name="Slide Image Placeholder 1"/>
+          <p:cNvSpPr>
+            <a:spLocks noGrp="1" noRot="1" noChangeAspect="1"/>
+          </p:cNvSpPr>
+          <p:nvPr>
+            <p:ph type="sldImg"/>
+          </p:nvPr>
+        </p:nvSpPr>
+        <p:spPr/>
+      </p:sp>
+      <p:sp>
+        <p:nvSpPr>
+          <p:cNvPr id="3" name="Notes Placeholder 2"/>
+          <p:cNvSpPr>
+            <a:spLocks noGrp="1"/>
+          </p:cNvSpPr>
+          <p:nvPr>
+            <p:ph type="body" idx="1"/>
+          </p:nvPr>
+        </p:nvSpPr>
+        <p:spPr/>
+        <p:txBody>
+          <a:bodyPr/>
+          <a:lstStyle/>
+          <a:p>
+            <a:endParaRPr lang="en-US" dirty="0"/>
+          </a:p>
+        </p:txBody>
+      </p:sp>
+      <p:sp>
+        <p:nvSpPr>
+          <p:cNvPr id="4" name="Slide Number Placeholder 3"/>
+          <p:cNvSpPr>
+            <a:spLocks noGrp="1"/>
+          </p:cNvSpPr>
+          <p:nvPr>
+            <p:ph type="sldNum" sz="quarter" idx="5"/>
+          </p:nvPr>
+        </p:nvSpPr>
+        <p:spPr/>
+        <p:txBody>
+          <a:bodyPr/>
+          <a:lstStyle/>
+          <a:p>
+            <a:fld id="{14AC118C-48E1-4114-9041-6A465FDC6B30}" type="slidenum">
+              <a:rPr lang="en-US" smtClean="0"/>
+              <a:t>10</a:t>
+            </a:fld>
+            <a:endParaRPr lang="en-US"/>
+          </a:p>
+        </p:txBody>
+      </p:sp>
+    </p:spTree>
+    <p:extLst>
+      <p:ext uri="{BB962C8B-B14F-4D97-AF65-F5344CB8AC3E}">
+        <p14:creationId xmlns:p14="http://schemas.microsoft.com/office/powerpoint/2010/main" val="739134558"/>
+      </p:ext>
+    </p:extLst>
+  </p:cSld>
+  <p:clrMapOvr>
+    <a:masterClrMapping/>
+  </p:clrMapOvr>
+</p:notes>
+</file>
+
 <file path=ppt/slideLayouts/slideLayout1.xml><?xml version="1.0" encoding="utf-8"?>
 <p:sldLayout xmlns:a="http://schemas.openxmlformats.org/drawingml/2006/main" xmlns:r="http://schemas.openxmlformats.org/officeDocument/2006/relationships" xmlns:p="http://schemas.openxmlformats.org/presentationml/2006/main" showMasterSp="0" type="title" preserve="1">
   <p:cSld name="Title Slide">
@@ -6009,7 +6444,7 @@
           <a:p>
             <a:fld id="{DBD2F3E9-BE90-45A2-A0FE-51AA72662F8F}" type="datetimeFigureOut">
               <a:rPr lang="en-US" smtClean="0"/>
-              <a:t>2/7/2022</a:t>
+              <a:t>2/8/2022</a:t>
             </a:fld>
             <a:endParaRPr lang="en-US"/>
           </a:p>
@@ -6445,7 +6880,7 @@
           <a:p>
             <a:fld id="{DBD2F3E9-BE90-45A2-A0FE-51AA72662F8F}" type="datetimeFigureOut">
               <a:rPr lang="en-US" smtClean="0"/>
-              <a:t>2/7/2022</a:t>
+              <a:t>2/8/2022</a:t>
             </a:fld>
             <a:endParaRPr lang="en-US"/>
           </a:p>
@@ -6695,7 +7130,7 @@
           <a:p>
             <a:fld id="{DBD2F3E9-BE90-45A2-A0FE-51AA72662F8F}" type="datetimeFigureOut">
               <a:rPr lang="en-US" smtClean="0"/>
-              <a:t>2/7/2022</a:t>
+              <a:t>2/8/2022</a:t>
             </a:fld>
             <a:endParaRPr lang="en-US"/>
           </a:p>
@@ -7003,7 +7438,7 @@
           <a:p>
             <a:fld id="{DBD2F3E9-BE90-45A2-A0FE-51AA72662F8F}" type="datetimeFigureOut">
               <a:rPr lang="en-US" smtClean="0"/>
-              <a:t>2/7/2022</a:t>
+              <a:t>2/8/2022</a:t>
             </a:fld>
             <a:endParaRPr lang="en-US"/>
           </a:p>
@@ -7321,7 +7756,7 @@
           <a:p>
             <a:fld id="{DBD2F3E9-BE90-45A2-A0FE-51AA72662F8F}" type="datetimeFigureOut">
               <a:rPr lang="en-US" smtClean="0"/>
-              <a:t>2/7/2022</a:t>
+              <a:t>2/8/2022</a:t>
             </a:fld>
             <a:endParaRPr lang="en-US"/>
           </a:p>
@@ -7623,7 +8058,7 @@
           <a:p>
             <a:fld id="{DBD2F3E9-BE90-45A2-A0FE-51AA72662F8F}" type="datetimeFigureOut">
               <a:rPr lang="en-US" smtClean="0"/>
-              <a:t>2/7/2022</a:t>
+              <a:t>2/8/2022</a:t>
             </a:fld>
             <a:endParaRPr lang="en-US"/>
           </a:p>
@@ -7990,7 +8425,7 @@
           <a:p>
             <a:fld id="{DBD2F3E9-BE90-45A2-A0FE-51AA72662F8F}" type="datetimeFigureOut">
               <a:rPr lang="en-US" smtClean="0"/>
-              <a:t>2/7/2022</a:t>
+              <a:t>2/8/2022</a:t>
             </a:fld>
             <a:endParaRPr lang="en-US"/>
           </a:p>
@@ -8164,7 +8599,7 @@
           <a:p>
             <a:fld id="{DBD2F3E9-BE90-45A2-A0FE-51AA72662F8F}" type="datetimeFigureOut">
               <a:rPr lang="en-US" smtClean="0"/>
-              <a:t>2/7/2022</a:t>
+              <a:t>2/8/2022</a:t>
             </a:fld>
             <a:endParaRPr lang="en-US"/>
           </a:p>
@@ -8344,7 +8779,7 @@
           <a:p>
             <a:fld id="{DBD2F3E9-BE90-45A2-A0FE-51AA72662F8F}" type="datetimeFigureOut">
               <a:rPr lang="en-US" smtClean="0"/>
-              <a:t>2/7/2022</a:t>
+              <a:t>2/8/2022</a:t>
             </a:fld>
             <a:endParaRPr lang="en-US"/>
           </a:p>
@@ -8514,7 +8949,7 @@
           <a:p>
             <a:fld id="{DBD2F3E9-BE90-45A2-A0FE-51AA72662F8F}" type="datetimeFigureOut">
               <a:rPr lang="en-US" smtClean="0"/>
-              <a:t>2/7/2022</a:t>
+              <a:t>2/8/2022</a:t>
             </a:fld>
             <a:endParaRPr lang="en-US"/>
           </a:p>
@@ -8764,7 +9199,7 @@
           <a:p>
             <a:fld id="{DBD2F3E9-BE90-45A2-A0FE-51AA72662F8F}" type="datetimeFigureOut">
               <a:rPr lang="en-US" smtClean="0"/>
-              <a:t>2/7/2022</a:t>
+              <a:t>2/8/2022</a:t>
             </a:fld>
             <a:endParaRPr lang="en-US"/>
           </a:p>
@@ -9000,7 +9435,7 @@
           <a:p>
             <a:fld id="{DBD2F3E9-BE90-45A2-A0FE-51AA72662F8F}" type="datetimeFigureOut">
               <a:rPr lang="en-US" smtClean="0"/>
-              <a:t>2/7/2022</a:t>
+              <a:t>2/8/2022</a:t>
             </a:fld>
             <a:endParaRPr lang="en-US"/>
           </a:p>
@@ -9382,7 +9817,7 @@
           <a:p>
             <a:fld id="{DBD2F3E9-BE90-45A2-A0FE-51AA72662F8F}" type="datetimeFigureOut">
               <a:rPr lang="en-US" smtClean="0"/>
-              <a:t>2/7/2022</a:t>
+              <a:t>2/8/2022</a:t>
             </a:fld>
             <a:endParaRPr lang="en-US"/>
           </a:p>
@@ -9500,7 +9935,7 @@
           <a:p>
             <a:fld id="{DBD2F3E9-BE90-45A2-A0FE-51AA72662F8F}" type="datetimeFigureOut">
               <a:rPr lang="en-US" smtClean="0"/>
-              <a:t>2/7/2022</a:t>
+              <a:t>2/8/2022</a:t>
             </a:fld>
             <a:endParaRPr lang="en-US"/>
           </a:p>
@@ -9595,7 +10030,7 @@
           <a:p>
             <a:fld id="{DBD2F3E9-BE90-45A2-A0FE-51AA72662F8F}" type="datetimeFigureOut">
               <a:rPr lang="en-US" smtClean="0"/>
-              <a:t>2/7/2022</a:t>
+              <a:t>2/8/2022</a:t>
             </a:fld>
             <a:endParaRPr lang="en-US"/>
           </a:p>
@@ -9850,7 +10285,7 @@
           <a:p>
             <a:fld id="{DBD2F3E9-BE90-45A2-A0FE-51AA72662F8F}" type="datetimeFigureOut">
               <a:rPr lang="en-US" smtClean="0"/>
-              <a:t>2/7/2022</a:t>
+              <a:t>2/8/2022</a:t>
             </a:fld>
             <a:endParaRPr lang="en-US"/>
           </a:p>
@@ -10133,7 +10568,7 @@
           <a:p>
             <a:fld id="{DBD2F3E9-BE90-45A2-A0FE-51AA72662F8F}" type="datetimeFigureOut">
               <a:rPr lang="en-US" smtClean="0"/>
-              <a:t>2/7/2022</a:t>
+              <a:t>2/8/2022</a:t>
             </a:fld>
             <a:endParaRPr lang="en-US"/>
           </a:p>
@@ -10539,7 +10974,7 @@
           <a:p>
             <a:fld id="{DBD2F3E9-BE90-45A2-A0FE-51AA72662F8F}" type="datetimeFigureOut">
               <a:rPr lang="en-US" smtClean="0"/>
-              <a:t>2/7/2022</a:t>
+              <a:t>2/8/2022</a:t>
             </a:fld>
             <a:endParaRPr lang="en-US"/>
           </a:p>
@@ -11090,12 +11525,49 @@
             <p:ph type="title"/>
           </p:nvPr>
         </p:nvSpPr>
-        <p:spPr/>
+        <p:spPr>
+          <a:xfrm>
+            <a:off x="622068" y="1583513"/>
+            <a:ext cx="8534400" cy="1507067"/>
+          </a:xfrm>
+        </p:spPr>
         <p:txBody>
-          <a:bodyPr/>
+          <a:bodyPr>
+            <a:normAutofit fontScale="90000"/>
+          </a:bodyPr>
           <a:lstStyle/>
           <a:p>
-            <a:endParaRPr lang="en-US"/>
+            <a:r>
+              <a:rPr lang="en-US" dirty="0" err="1"/>
+              <a:t>Analysıs</a:t>
+            </a:r>
+            <a:r>
+              <a:rPr lang="en-US" dirty="0"/>
+              <a:t> OF </a:t>
+            </a:r>
+            <a:r>
+              <a:rPr lang="en-US" i="1" dirty="0"/>
+              <a:t>Deep Multilayer </a:t>
+            </a:r>
+            <a:r>
+              <a:rPr lang="en-US" i="1" dirty="0" err="1"/>
+              <a:t>Perceptrons</a:t>
+            </a:r>
+            <a:r>
+              <a:rPr lang="en-US" i="1" dirty="0"/>
+              <a:t> for Dimensional</a:t>
+            </a:r>
+            <a:br>
+              <a:rPr lang="en-US" i="1" dirty="0"/>
+            </a:br>
+            <a:r>
+              <a:rPr lang="en-US" i="1" dirty="0"/>
+              <a:t>Speech Emotion Recognition </a:t>
+            </a:r>
+            <a:br>
+              <a:rPr lang="en-US" i="1" dirty="0"/>
+            </a:br>
+            <a:endParaRPr lang="en-US" i="1" dirty="0"/>
           </a:p>
         </p:txBody>
       </p:sp>
@@ -11115,12 +11587,20 @@
             <p:ph idx="1"/>
           </p:nvPr>
         </p:nvSpPr>
-        <p:spPr/>
+        <p:spPr>
+          <a:xfrm>
+            <a:off x="622068" y="2337047"/>
+            <a:ext cx="8534400" cy="3615267"/>
+          </a:xfrm>
+        </p:spPr>
         <p:txBody>
           <a:bodyPr/>
           <a:lstStyle/>
           <a:p>
-            <a:endParaRPr lang="en-US"/>
+            <a:r>
+              <a:rPr lang="en-US" dirty="0"/>
+              <a:t>Kutay Uğurlu</a:t>
+            </a:r>
           </a:p>
         </p:txBody>
       </p:sp>
@@ -11138,86 +11618,6 @@
 </file>
 
 <file path=ppt/slides/slide10.xml><?xml version="1.0" encoding="utf-8"?>
-<p:sld xmlns:a="http://schemas.openxmlformats.org/drawingml/2006/main" xmlns:r="http://schemas.openxmlformats.org/officeDocument/2006/relationships" xmlns:p="http://schemas.openxmlformats.org/presentationml/2006/main">
-  <p:cSld>
-    <p:spTree>
-      <p:nvGrpSpPr>
-        <p:cNvPr id="1" name=""/>
-        <p:cNvGrpSpPr/>
-        <p:nvPr/>
-      </p:nvGrpSpPr>
-      <p:grpSpPr>
-        <a:xfrm>
-          <a:off x="0" y="0"/>
-          <a:ext cx="0" cy="0"/>
-          <a:chOff x="0" y="0"/>
-          <a:chExt cx="0" cy="0"/>
-        </a:xfrm>
-      </p:grpSpPr>
-      <p:sp>
-        <p:nvSpPr>
-          <p:cNvPr id="2" name="Title 1">
-            <a:extLst>
-              <a:ext uri="{FF2B5EF4-FFF2-40B4-BE49-F238E27FC236}">
-                <a16:creationId xmlns:a16="http://schemas.microsoft.com/office/drawing/2014/main" id="{F6E32B69-14D0-4469-B8AB-8F9BF4332538}"/>
-              </a:ext>
-            </a:extLst>
-          </p:cNvPr>
-          <p:cNvSpPr>
-            <a:spLocks noGrp="1"/>
-          </p:cNvSpPr>
-          <p:nvPr>
-            <p:ph type="title"/>
-          </p:nvPr>
-        </p:nvSpPr>
-        <p:spPr/>
-        <p:txBody>
-          <a:bodyPr/>
-          <a:lstStyle/>
-          <a:p>
-            <a:endParaRPr lang="en-US" dirty="0"/>
-          </a:p>
-        </p:txBody>
-      </p:sp>
-      <p:sp>
-        <p:nvSpPr>
-          <p:cNvPr id="3" name="Content Placeholder 2">
-            <a:extLst>
-              <a:ext uri="{FF2B5EF4-FFF2-40B4-BE49-F238E27FC236}">
-                <a16:creationId xmlns:a16="http://schemas.microsoft.com/office/drawing/2014/main" id="{B27FCFBC-1BB1-4D92-A0FD-5E2E2C7E0D2C}"/>
-              </a:ext>
-            </a:extLst>
-          </p:cNvPr>
-          <p:cNvSpPr>
-            <a:spLocks noGrp="1"/>
-          </p:cNvSpPr>
-          <p:nvPr>
-            <p:ph idx="1"/>
-          </p:nvPr>
-        </p:nvSpPr>
-        <p:spPr/>
-        <p:txBody>
-          <a:bodyPr/>
-          <a:lstStyle/>
-          <a:p>
-            <a:endParaRPr lang="en-US"/>
-          </a:p>
-        </p:txBody>
-      </p:sp>
-    </p:spTree>
-    <p:extLst>
-      <p:ext uri="{BB962C8B-B14F-4D97-AF65-F5344CB8AC3E}">
-        <p14:creationId xmlns:p14="http://schemas.microsoft.com/office/powerpoint/2010/main" val="3232827333"/>
-      </p:ext>
-    </p:extLst>
-  </p:cSld>
-  <p:clrMapOvr>
-    <a:masterClrMapping/>
-  </p:clrMapOvr>
-</p:sld>
-</file>
-
-<file path=ppt/slides/slide11.xml><?xml version="1.0" encoding="utf-8"?>
 <p:sld xmlns:a="http://schemas.openxmlformats.org/drawingml/2006/main" xmlns:r="http://schemas.openxmlformats.org/officeDocument/2006/relationships" xmlns:p="http://schemas.openxmlformats.org/presentationml/2006/main">
   <p:cSld>
     <p:spTree>
@@ -11256,16 +11656,16 @@
         </p:xfrm>
         <a:graphic>
           <a:graphicData uri="http://schemas.openxmlformats.org/drawingml/2006/diagram">
-            <dgm:relIds xmlns:dgm="http://schemas.openxmlformats.org/drawingml/2006/diagram" xmlns:r="http://schemas.openxmlformats.org/officeDocument/2006/relationships" r:dm="rId2" r:lo="rId3" r:qs="rId4" r:cs="rId5"/>
+            <dgm:relIds xmlns:dgm="http://schemas.openxmlformats.org/drawingml/2006/diagram" xmlns:r="http://schemas.openxmlformats.org/officeDocument/2006/relationships" r:dm="rId3" r:lo="rId4" r:qs="rId5" r:cs="rId6"/>
           </a:graphicData>
         </a:graphic>
       </p:graphicFrame>
       <p:pic>
         <p:nvPicPr>
-          <p:cNvPr id="5" name="Picture 4">
+          <p:cNvPr id="3" name="Picture 2">
             <a:extLst>
               <a:ext uri="{FF2B5EF4-FFF2-40B4-BE49-F238E27FC236}">
-                <a16:creationId xmlns:a16="http://schemas.microsoft.com/office/drawing/2014/main" id="{7897A03B-2F11-44AC-861E-7BAD99C5CCAB}"/>
+                <a16:creationId xmlns:a16="http://schemas.microsoft.com/office/drawing/2014/main" id="{AE55D0E7-DD41-4EC3-8A2C-8D7EC4E170DE}"/>
               </a:ext>
             </a:extLst>
           </p:cNvPr>
@@ -11275,15 +11675,15 @@
           <p:nvPr/>
         </p:nvPicPr>
         <p:blipFill>
-          <a:blip r:embed="rId7"/>
+          <a:blip r:embed="rId8"/>
           <a:stretch>
             <a:fillRect/>
           </a:stretch>
         </p:blipFill>
         <p:spPr>
           <a:xfrm>
-            <a:off x="2246621" y="251669"/>
-            <a:ext cx="7698758" cy="3765415"/>
+            <a:off x="1175459" y="76667"/>
+            <a:ext cx="9841081" cy="4161609"/>
           </a:xfrm>
           <a:prstGeom prst="rect">
             <a:avLst/>
@@ -11304,86 +11704,6 @@
 </file>
 
 <file path=ppt/slides/slide2.xml><?xml version="1.0" encoding="utf-8"?>
-<p:sld xmlns:a="http://schemas.openxmlformats.org/drawingml/2006/main" xmlns:r="http://schemas.openxmlformats.org/officeDocument/2006/relationships" xmlns:p="http://schemas.openxmlformats.org/presentationml/2006/main">
-  <p:cSld>
-    <p:spTree>
-      <p:nvGrpSpPr>
-        <p:cNvPr id="1" name=""/>
-        <p:cNvGrpSpPr/>
-        <p:nvPr/>
-      </p:nvGrpSpPr>
-      <p:grpSpPr>
-        <a:xfrm>
-          <a:off x="0" y="0"/>
-          <a:ext cx="0" cy="0"/>
-          <a:chOff x="0" y="0"/>
-          <a:chExt cx="0" cy="0"/>
-        </a:xfrm>
-      </p:grpSpPr>
-      <p:sp>
-        <p:nvSpPr>
-          <p:cNvPr id="2" name="Title 1">
-            <a:extLst>
-              <a:ext uri="{FF2B5EF4-FFF2-40B4-BE49-F238E27FC236}">
-                <a16:creationId xmlns:a16="http://schemas.microsoft.com/office/drawing/2014/main" id="{078CE1AA-46FB-4C8F-8E94-5FAF03C0255B}"/>
-              </a:ext>
-            </a:extLst>
-          </p:cNvPr>
-          <p:cNvSpPr>
-            <a:spLocks noGrp="1"/>
-          </p:cNvSpPr>
-          <p:nvPr>
-            <p:ph type="title"/>
-          </p:nvPr>
-        </p:nvSpPr>
-        <p:spPr/>
-        <p:txBody>
-          <a:bodyPr/>
-          <a:lstStyle/>
-          <a:p>
-            <a:endParaRPr lang="en-US"/>
-          </a:p>
-        </p:txBody>
-      </p:sp>
-      <p:sp>
-        <p:nvSpPr>
-          <p:cNvPr id="3" name="Content Placeholder 2">
-            <a:extLst>
-              <a:ext uri="{FF2B5EF4-FFF2-40B4-BE49-F238E27FC236}">
-                <a16:creationId xmlns:a16="http://schemas.microsoft.com/office/drawing/2014/main" id="{0C263969-6E65-48A7-9EAF-431BFB8E58BB}"/>
-              </a:ext>
-            </a:extLst>
-          </p:cNvPr>
-          <p:cNvSpPr>
-            <a:spLocks noGrp="1"/>
-          </p:cNvSpPr>
-          <p:nvPr>
-            <p:ph idx="1"/>
-          </p:nvPr>
-        </p:nvSpPr>
-        <p:spPr/>
-        <p:txBody>
-          <a:bodyPr/>
-          <a:lstStyle/>
-          <a:p>
-            <a:endParaRPr lang="en-US"/>
-          </a:p>
-        </p:txBody>
-      </p:sp>
-    </p:spTree>
-    <p:extLst>
-      <p:ext uri="{BB962C8B-B14F-4D97-AF65-F5344CB8AC3E}">
-        <p14:creationId xmlns:p14="http://schemas.microsoft.com/office/powerpoint/2010/main" val="3950928856"/>
-      </p:ext>
-    </p:extLst>
-  </p:cSld>
-  <p:clrMapOvr>
-    <a:masterClrMapping/>
-  </p:clrMapOvr>
-</p:sld>
-</file>
-
-<file path=ppt/slides/slide3.xml><?xml version="1.0" encoding="utf-8"?>
 <p:sld xmlns:a="http://schemas.openxmlformats.org/drawingml/2006/main" xmlns:r="http://schemas.openxmlformats.org/officeDocument/2006/relationships" xmlns:p="http://schemas.openxmlformats.org/presentationml/2006/main">
   <p:cSld>
     <p:bg>
@@ -11918,7 +12238,7 @@
 </p:sld>
 </file>
 
-<file path=ppt/slides/slide4.xml><?xml version="1.0" encoding="utf-8"?>
+<file path=ppt/slides/slide3.xml><?xml version="1.0" encoding="utf-8"?>
 <p:sld xmlns:a="http://schemas.openxmlformats.org/drawingml/2006/main" xmlns:r="http://schemas.openxmlformats.org/officeDocument/2006/relationships" xmlns:p="http://schemas.openxmlformats.org/presentationml/2006/main">
   <p:cSld>
     <p:bg>
@@ -12517,7 +12837,7 @@
 </p:sld>
 </file>
 
-<file path=ppt/slides/slide5.xml><?xml version="1.0" encoding="utf-8"?>
+<file path=ppt/slides/slide4.xml><?xml version="1.0" encoding="utf-8"?>
 <p:sld xmlns:a="http://schemas.openxmlformats.org/drawingml/2006/main" xmlns:r="http://schemas.openxmlformats.org/officeDocument/2006/relationships" xmlns:p="http://schemas.openxmlformats.org/presentationml/2006/main">
   <p:cSld>
     <p:bg>
@@ -13138,7 +13458,7 @@
 </p:sld>
 </file>
 
-<file path=ppt/slides/slide6.xml><?xml version="1.0" encoding="utf-8"?>
+<file path=ppt/slides/slide5.xml><?xml version="1.0" encoding="utf-8"?>
 <p:sld xmlns:a="http://schemas.openxmlformats.org/drawingml/2006/main" xmlns:r="http://schemas.openxmlformats.org/officeDocument/2006/relationships" xmlns:p="http://schemas.openxmlformats.org/presentationml/2006/main">
   <p:cSld>
     <p:bg>
@@ -13602,7 +13922,7 @@
 </p:sld>
 </file>
 
-<file path=ppt/slides/slide7.xml><?xml version="1.0" encoding="utf-8"?>
+<file path=ppt/slides/slide6.xml><?xml version="1.0" encoding="utf-8"?>
 <p:sld xmlns:a="http://schemas.openxmlformats.org/drawingml/2006/main" xmlns:r="http://schemas.openxmlformats.org/officeDocument/2006/relationships" xmlns:p="http://schemas.openxmlformats.org/presentationml/2006/main">
   <p:cSld>
     <p:spTree>
@@ -13708,8 +14028,8 @@
             <a:chExt cx="6849431" cy="1077603"/>
           </a:xfrm>
         </p:grpSpPr>
-        <mc:AlternateContent xmlns:mc="http://schemas.openxmlformats.org/markup-compatibility/2006">
-          <mc:Choice xmlns:a14="http://schemas.microsoft.com/office/drawing/2010/main" Requires="a14">
+        <mc:AlternateContent xmlns:mc="http://schemas.openxmlformats.org/markup-compatibility/2006" xmlns:a14="http://schemas.microsoft.com/office/drawing/2010/main">
+          <mc:Choice Requires="a14">
             <p:sp>
               <p:nvSpPr>
                 <p:cNvPr id="7" name="TextBox 6">
@@ -13812,7 +14132,7 @@
               </p:txBody>
             </p:sp>
           </mc:Choice>
-          <mc:Fallback>
+          <mc:Fallback xmlns="">
             <p:sp>
               <p:nvSpPr>
                 <p:cNvPr id="7" name="TextBox 6">
@@ -13857,8 +14177,8 @@
             </p:sp>
           </mc:Fallback>
         </mc:AlternateContent>
-        <mc:AlternateContent xmlns:mc="http://schemas.openxmlformats.org/markup-compatibility/2006">
-          <mc:Choice xmlns:a14="http://schemas.microsoft.com/office/drawing/2010/main" Requires="a14">
+        <mc:AlternateContent xmlns:mc="http://schemas.openxmlformats.org/markup-compatibility/2006" xmlns:a14="http://schemas.microsoft.com/office/drawing/2010/main">
+          <mc:Choice Requires="a14">
             <p:sp>
               <p:nvSpPr>
                 <p:cNvPr id="9" name="TextBox 8">
@@ -13887,6 +14207,7 @@
                 </a:bodyPr>
                 <a:lstStyle/>
                 <a:p>
+                  <a:pPr/>
                   <a14:m>
                     <m:oMathPara xmlns:m="http://schemas.openxmlformats.org/officeDocument/2006/math">
                       <m:oMathParaPr>
@@ -14012,7 +14333,7 @@
               </p:txBody>
             </p:sp>
           </mc:Choice>
-          <mc:Fallback>
+          <mc:Fallback xmlns="">
             <p:sp>
               <p:nvSpPr>
                 <p:cNvPr id="9" name="TextBox 8">
@@ -14071,9 +14392,17 @@
 </p:sld>
 </file>
 
-<file path=ppt/slides/slide8.xml><?xml version="1.0" encoding="utf-8"?>
+<file path=ppt/slides/slide7.xml><?xml version="1.0" encoding="utf-8"?>
 <p:sld xmlns:a="http://schemas.openxmlformats.org/drawingml/2006/main" xmlns:r="http://schemas.openxmlformats.org/officeDocument/2006/relationships" xmlns:p="http://schemas.openxmlformats.org/presentationml/2006/main">
   <p:cSld>
+    <p:bg>
+      <p:bgPr>
+        <a:solidFill>
+          <a:schemeClr val="bg1"/>
+        </a:solidFill>
+        <a:effectLst/>
+      </p:bgPr>
+    </p:bg>
     <p:spTree>
       <p:nvGrpSpPr>
         <p:cNvPr id="1" name=""/>
@@ -14088,6 +14417,326 @@
           <a:chExt cx="0" cy="0"/>
         </a:xfrm>
       </p:grpSpPr>
+      <p:cxnSp>
+        <p:nvCxnSpPr>
+          <p:cNvPr id="10" name="Straight Connector 9">
+            <a:extLst>
+              <a:ext uri="{FF2B5EF4-FFF2-40B4-BE49-F238E27FC236}">
+                <a16:creationId xmlns:a16="http://schemas.microsoft.com/office/drawing/2014/main" id="{0512F9CB-A1A0-4043-A103-F6A4B94B695A}"/>
+              </a:ext>
+              <a:ext uri="{C183D7F6-B498-43B3-948B-1728B52AA6E4}">
+                <adec:decorative xmlns:adec="http://schemas.microsoft.com/office/drawing/2017/decorative" val="1"/>
+              </a:ext>
+            </a:extLst>
+          </p:cNvPr>
+          <p:cNvCxnSpPr>
+            <a:cxnSpLocks noGrp="1" noRot="1" noChangeAspect="1" noMove="1" noResize="1" noEditPoints="1" noAdjustHandles="1" noChangeArrowheads="1" noChangeShapeType="1"/>
+          </p:cNvCxnSpPr>
+          <p:nvPr>
+            <p:extLst>
+              <p:ext uri="{386F3935-93C4-4BCD-93E2-E3B085C9AB24}">
+                <p16:designElem xmlns:p16="http://schemas.microsoft.com/office/powerpoint/2015/main" val="1"/>
+              </p:ext>
+            </p:extLst>
+          </p:nvPr>
+        </p:nvCxnSpPr>
+        <p:spPr>
+          <a:xfrm flipH="1">
+            <a:off x="8228012" y="8467"/>
+            <a:ext cx="3810000" cy="3810000"/>
+          </a:xfrm>
+          <a:prstGeom prst="line">
+            <a:avLst/>
+          </a:prstGeom>
+          <a:ln w="12700">
+            <a:solidFill>
+              <a:schemeClr val="tx1"/>
+            </a:solidFill>
+          </a:ln>
+        </p:spPr>
+        <p:style>
+          <a:lnRef idx="2">
+            <a:schemeClr val="accent1"/>
+          </a:lnRef>
+          <a:fillRef idx="0">
+            <a:schemeClr val="accent1"/>
+          </a:fillRef>
+          <a:effectRef idx="1">
+            <a:schemeClr val="accent1"/>
+          </a:effectRef>
+          <a:fontRef idx="minor">
+            <a:schemeClr val="tx1"/>
+          </a:fontRef>
+        </p:style>
+      </p:cxnSp>
+      <p:cxnSp>
+        <p:nvCxnSpPr>
+          <p:cNvPr id="12" name="Straight Connector 11">
+            <a:extLst>
+              <a:ext uri="{FF2B5EF4-FFF2-40B4-BE49-F238E27FC236}">
+                <a16:creationId xmlns:a16="http://schemas.microsoft.com/office/drawing/2014/main" id="{ADBE6588-EE16-4389-857C-86A156D49E5D}"/>
+              </a:ext>
+              <a:ext uri="{C183D7F6-B498-43B3-948B-1728B52AA6E4}">
+                <adec:decorative xmlns:adec="http://schemas.microsoft.com/office/drawing/2017/decorative" val="1"/>
+              </a:ext>
+            </a:extLst>
+          </p:cNvPr>
+          <p:cNvCxnSpPr>
+            <a:cxnSpLocks noGrp="1" noRot="1" noChangeAspect="1" noMove="1" noResize="1" noEditPoints="1" noAdjustHandles="1" noChangeArrowheads="1" noChangeShapeType="1"/>
+          </p:cNvCxnSpPr>
+          <p:nvPr>
+            <p:extLst>
+              <p:ext uri="{386F3935-93C4-4BCD-93E2-E3B085C9AB24}">
+                <p16:designElem xmlns:p16="http://schemas.microsoft.com/office/powerpoint/2015/main" val="1"/>
+              </p:ext>
+            </p:extLst>
+          </p:nvPr>
+        </p:nvCxnSpPr>
+        <p:spPr>
+          <a:xfrm flipH="1">
+            <a:off x="6108170" y="91545"/>
+            <a:ext cx="6080655" cy="6080655"/>
+          </a:xfrm>
+          <a:prstGeom prst="line">
+            <a:avLst/>
+          </a:prstGeom>
+          <a:ln w="12700">
+            <a:solidFill>
+              <a:schemeClr val="tx1"/>
+            </a:solidFill>
+          </a:ln>
+        </p:spPr>
+        <p:style>
+          <a:lnRef idx="2">
+            <a:schemeClr val="accent1"/>
+          </a:lnRef>
+          <a:fillRef idx="0">
+            <a:schemeClr val="accent1"/>
+          </a:fillRef>
+          <a:effectRef idx="1">
+            <a:schemeClr val="accent1"/>
+          </a:effectRef>
+          <a:fontRef idx="minor">
+            <a:schemeClr val="tx1"/>
+          </a:fontRef>
+        </p:style>
+      </p:cxnSp>
+      <p:cxnSp>
+        <p:nvCxnSpPr>
+          <p:cNvPr id="14" name="Straight Connector 13">
+            <a:extLst>
+              <a:ext uri="{FF2B5EF4-FFF2-40B4-BE49-F238E27FC236}">
+                <a16:creationId xmlns:a16="http://schemas.microsoft.com/office/drawing/2014/main" id="{17FD48D2-B0A7-413D-B947-AA55AC1296D5}"/>
+              </a:ext>
+              <a:ext uri="{C183D7F6-B498-43B3-948B-1728B52AA6E4}">
+                <adec:decorative xmlns:adec="http://schemas.microsoft.com/office/drawing/2017/decorative" val="1"/>
+              </a:ext>
+            </a:extLst>
+          </p:cNvPr>
+          <p:cNvCxnSpPr>
+            <a:cxnSpLocks noGrp="1" noRot="1" noChangeAspect="1" noMove="1" noResize="1" noEditPoints="1" noAdjustHandles="1" noChangeArrowheads="1" noChangeShapeType="1"/>
+          </p:cNvCxnSpPr>
+          <p:nvPr>
+            <p:extLst>
+              <p:ext uri="{386F3935-93C4-4BCD-93E2-E3B085C9AB24}">
+                <p16:designElem xmlns:p16="http://schemas.microsoft.com/office/powerpoint/2015/main" val="1"/>
+              </p:ext>
+            </p:extLst>
+          </p:nvPr>
+        </p:nvCxnSpPr>
+        <p:spPr>
+          <a:xfrm flipH="1">
+            <a:off x="7235825" y="228600"/>
+            <a:ext cx="4953000" cy="4953000"/>
+          </a:xfrm>
+          <a:prstGeom prst="line">
+            <a:avLst/>
+          </a:prstGeom>
+          <a:ln w="12700">
+            <a:solidFill>
+              <a:schemeClr val="tx1"/>
+            </a:solidFill>
+          </a:ln>
+        </p:spPr>
+        <p:style>
+          <a:lnRef idx="2">
+            <a:schemeClr val="accent1"/>
+          </a:lnRef>
+          <a:fillRef idx="0">
+            <a:schemeClr val="accent1"/>
+          </a:fillRef>
+          <a:effectRef idx="1">
+            <a:schemeClr val="accent1"/>
+          </a:effectRef>
+          <a:fontRef idx="minor">
+            <a:schemeClr val="tx1"/>
+          </a:fontRef>
+        </p:style>
+      </p:cxnSp>
+      <p:cxnSp>
+        <p:nvCxnSpPr>
+          <p:cNvPr id="16" name="Straight Connector 15">
+            <a:extLst>
+              <a:ext uri="{FF2B5EF4-FFF2-40B4-BE49-F238E27FC236}">
+                <a16:creationId xmlns:a16="http://schemas.microsoft.com/office/drawing/2014/main" id="{2BE668D0-D906-4EEE-B32F-8C028624B837}"/>
+              </a:ext>
+              <a:ext uri="{C183D7F6-B498-43B3-948B-1728B52AA6E4}">
+                <adec:decorative xmlns:adec="http://schemas.microsoft.com/office/drawing/2017/decorative" val="1"/>
+              </a:ext>
+            </a:extLst>
+          </p:cNvPr>
+          <p:cNvCxnSpPr>
+            <a:cxnSpLocks noGrp="1" noRot="1" noChangeAspect="1" noMove="1" noResize="1" noEditPoints="1" noAdjustHandles="1" noChangeArrowheads="1" noChangeShapeType="1"/>
+          </p:cNvCxnSpPr>
+          <p:nvPr>
+            <p:extLst>
+              <p:ext uri="{386F3935-93C4-4BCD-93E2-E3B085C9AB24}">
+                <p16:designElem xmlns:p16="http://schemas.microsoft.com/office/powerpoint/2015/main" val="1"/>
+              </p:ext>
+            </p:extLst>
+          </p:nvPr>
+        </p:nvCxnSpPr>
+        <p:spPr>
+          <a:xfrm flipH="1">
+            <a:off x="7335837" y="32278"/>
+            <a:ext cx="4852989" cy="4852989"/>
+          </a:xfrm>
+          <a:prstGeom prst="line">
+            <a:avLst/>
+          </a:prstGeom>
+          <a:ln w="31750">
+            <a:solidFill>
+              <a:schemeClr val="tx1"/>
+            </a:solidFill>
+          </a:ln>
+        </p:spPr>
+        <p:style>
+          <a:lnRef idx="2">
+            <a:schemeClr val="accent1"/>
+          </a:lnRef>
+          <a:fillRef idx="0">
+            <a:schemeClr val="accent1"/>
+          </a:fillRef>
+          <a:effectRef idx="1">
+            <a:schemeClr val="accent1"/>
+          </a:effectRef>
+          <a:fontRef idx="minor">
+            <a:schemeClr val="tx1"/>
+          </a:fontRef>
+        </p:style>
+      </p:cxnSp>
+      <p:cxnSp>
+        <p:nvCxnSpPr>
+          <p:cNvPr id="18" name="Straight Connector 17">
+            <a:extLst>
+              <a:ext uri="{FF2B5EF4-FFF2-40B4-BE49-F238E27FC236}">
+                <a16:creationId xmlns:a16="http://schemas.microsoft.com/office/drawing/2014/main" id="{D1DE67A3-B8F6-4CFD-A8E0-D15200F23152}"/>
+              </a:ext>
+              <a:ext uri="{C183D7F6-B498-43B3-948B-1728B52AA6E4}">
+                <adec:decorative xmlns:adec="http://schemas.microsoft.com/office/drawing/2017/decorative" val="1"/>
+              </a:ext>
+            </a:extLst>
+          </p:cNvPr>
+          <p:cNvCxnSpPr>
+            <a:cxnSpLocks noGrp="1" noRot="1" noChangeAspect="1" noMove="1" noResize="1" noEditPoints="1" noAdjustHandles="1" noChangeArrowheads="1" noChangeShapeType="1"/>
+          </p:cNvCxnSpPr>
+          <p:nvPr>
+            <p:extLst>
+              <p:ext uri="{386F3935-93C4-4BCD-93E2-E3B085C9AB24}">
+                <p16:designElem xmlns:p16="http://schemas.microsoft.com/office/powerpoint/2015/main" val="1"/>
+              </p:ext>
+            </p:extLst>
+          </p:nvPr>
+        </p:nvCxnSpPr>
+        <p:spPr>
+          <a:xfrm flipH="1">
+            <a:off x="7845426" y="609601"/>
+            <a:ext cx="4343399" cy="4343399"/>
+          </a:xfrm>
+          <a:prstGeom prst="line">
+            <a:avLst/>
+          </a:prstGeom>
+          <a:ln w="31750">
+            <a:solidFill>
+              <a:schemeClr val="tx1"/>
+            </a:solidFill>
+          </a:ln>
+        </p:spPr>
+        <p:style>
+          <a:lnRef idx="2">
+            <a:schemeClr val="accent1"/>
+          </a:lnRef>
+          <a:fillRef idx="0">
+            <a:schemeClr val="accent1"/>
+          </a:fillRef>
+          <a:effectRef idx="1">
+            <a:schemeClr val="accent1"/>
+          </a:effectRef>
+          <a:fontRef idx="minor">
+            <a:schemeClr val="tx1"/>
+          </a:fontRef>
+        </p:style>
+      </p:cxnSp>
+      <p:sp>
+        <p:nvSpPr>
+          <p:cNvPr id="20" name="Rectangle 19">
+            <a:extLst>
+              <a:ext uri="{FF2B5EF4-FFF2-40B4-BE49-F238E27FC236}">
+                <a16:creationId xmlns:a16="http://schemas.microsoft.com/office/drawing/2014/main" id="{991E317B-75E3-4171-A07A-B263C1D6DCA5}"/>
+              </a:ext>
+              <a:ext uri="{C183D7F6-B498-43B3-948B-1728B52AA6E4}">
+                <adec:decorative xmlns:adec="http://schemas.microsoft.com/office/drawing/2017/decorative" val="1"/>
+              </a:ext>
+            </a:extLst>
+          </p:cNvPr>
+          <p:cNvSpPr>
+            <a:spLocks noGrp="1" noRot="1" noChangeAspect="1" noMove="1" noResize="1" noEditPoints="1" noAdjustHandles="1" noChangeArrowheads="1" noChangeShapeType="1" noTextEdit="1"/>
+          </p:cNvSpPr>
+          <p:nvPr>
+            <p:extLst>
+              <p:ext uri="{386F3935-93C4-4BCD-93E2-E3B085C9AB24}">
+                <p16:designElem xmlns:p16="http://schemas.microsoft.com/office/powerpoint/2015/main" val="1"/>
+              </p:ext>
+            </p:extLst>
+          </p:nvPr>
+        </p:nvSpPr>
+        <p:spPr>
+          <a:xfrm>
+            <a:off x="0" y="0"/>
+            <a:ext cx="12192000" cy="6858000"/>
+          </a:xfrm>
+          <a:prstGeom prst="rect">
+            <a:avLst/>
+          </a:prstGeom>
+          <a:ln>
+            <a:noFill/>
+          </a:ln>
+        </p:spPr>
+        <p:style>
+          <a:lnRef idx="2">
+            <a:schemeClr val="accent1">
+              <a:shade val="50000"/>
+            </a:schemeClr>
+          </a:lnRef>
+          <a:fillRef idx="1002">
+            <a:schemeClr val="dk2"/>
+          </a:fillRef>
+          <a:effectRef idx="0">
+            <a:schemeClr val="accent1"/>
+          </a:effectRef>
+          <a:fontRef idx="minor">
+            <a:schemeClr val="lt1"/>
+          </a:fontRef>
+        </p:style>
+        <p:txBody>
+          <a:bodyPr rtlCol="0" anchor="ctr"/>
+          <a:lstStyle/>
+          <a:p>
+            <a:pPr algn="ctr"/>
+            <a:endParaRPr lang="en-US"/>
+          </a:p>
+        </p:txBody>
+      </p:sp>
       <p:sp>
         <p:nvSpPr>
           <p:cNvPr id="2" name="Title 1">
@@ -14104,43 +14753,419 @@
             <p:ph type="title"/>
           </p:nvPr>
         </p:nvSpPr>
-        <p:spPr/>
+        <p:spPr>
+          <a:xfrm>
+            <a:off x="7532710" y="628617"/>
+            <a:ext cx="3971902" cy="3028983"/>
+          </a:xfrm>
+        </p:spPr>
         <p:txBody>
-          <a:bodyPr/>
+          <a:bodyPr vert="horz" lIns="91440" tIns="45720" rIns="91440" bIns="45720" rtlCol="0" anchor="b">
+            <a:normAutofit/>
+          </a:bodyPr>
           <a:lstStyle/>
           <a:p>
             <a:r>
-              <a:rPr lang="en-US" dirty="0"/>
+              <a:rPr lang="en-US" sz="4800">
+                <a:solidFill>
+                  <a:srgbClr val="FFFFFF"/>
+                </a:solidFill>
+              </a:rPr>
               <a:t>MELD Dataset</a:t>
             </a:r>
           </a:p>
         </p:txBody>
       </p:sp>
-      <p:sp>
+      <p:sp useBgFill="1">
         <p:nvSpPr>
-          <p:cNvPr id="3" name="Content Placeholder 2">
+          <p:cNvPr id="22" name="Snip Diagonal Corner Rectangle 6">
             <a:extLst>
               <a:ext uri="{FF2B5EF4-FFF2-40B4-BE49-F238E27FC236}">
-                <a16:creationId xmlns:a16="http://schemas.microsoft.com/office/drawing/2014/main" id="{448BEFD9-5F33-4995-83F8-D1556B5D9148}"/>
+                <a16:creationId xmlns:a16="http://schemas.microsoft.com/office/drawing/2014/main" id="{4A9B19C2-B29A-4924-9E7E-6FBF17F5854E}"/>
+              </a:ext>
+              <a:ext uri="{C183D7F6-B498-43B3-948B-1728B52AA6E4}">
+                <adec:decorative xmlns:adec="http://schemas.microsoft.com/office/drawing/2017/decorative" val="1"/>
               </a:ext>
             </a:extLst>
           </p:cNvPr>
           <p:cNvSpPr>
-            <a:spLocks noGrp="1"/>
+            <a:spLocks noGrp="1" noRot="1" noChangeAspect="1" noMove="1" noResize="1" noEditPoints="1" noAdjustHandles="1" noChangeArrowheads="1" noChangeShapeType="1" noTextEdit="1"/>
           </p:cNvSpPr>
+          <p:nvPr>
+            <p:extLst>
+              <p:ext uri="{386F3935-93C4-4BCD-93E2-E3B085C9AB24}">
+                <p16:designElem xmlns:p16="http://schemas.microsoft.com/office/powerpoint/2015/main" val="1"/>
+              </p:ext>
+            </p:extLst>
+          </p:nvPr>
+        </p:nvSpPr>
+        <p:spPr>
+          <a:xfrm>
+            <a:off x="634000" y="620722"/>
+            <a:ext cx="6418778" cy="5286838"/>
+          </a:xfrm>
+          <a:prstGeom prst="snip2DiagRect">
+            <a:avLst>
+              <a:gd name="adj1" fmla="val 10973"/>
+              <a:gd name="adj2" fmla="val 0"/>
+            </a:avLst>
+          </a:prstGeom>
+          <a:ln>
+            <a:noFill/>
+          </a:ln>
+          <a:effectLst>
+            <a:innerShdw blurRad="57150" dist="38100" dir="14460000">
+              <a:prstClr val="black">
+                <a:alpha val="70000"/>
+              </a:prstClr>
+            </a:innerShdw>
+          </a:effectLst>
+        </p:spPr>
+        <p:style>
+          <a:lnRef idx="2">
+            <a:schemeClr val="accent1">
+              <a:shade val="50000"/>
+            </a:schemeClr>
+          </a:lnRef>
+          <a:fillRef idx="1">
+            <a:schemeClr val="accent1"/>
+          </a:fillRef>
+          <a:effectRef idx="0">
+            <a:schemeClr val="accent1"/>
+          </a:effectRef>
+          <a:fontRef idx="minor">
+            <a:schemeClr val="lt1"/>
+          </a:fontRef>
+        </p:style>
+        <p:txBody>
+          <a:bodyPr rtlCol="0" anchor="ctr"/>
+          <a:lstStyle/>
+          <a:p>
+            <a:pPr algn="ctr"/>
+            <a:endParaRPr lang="en-US"/>
+          </a:p>
+        </p:txBody>
+      </p:sp>
+      <p:pic>
+        <p:nvPicPr>
+          <p:cNvPr id="5" name="Content Placeholder 4" descr="Table&#10;&#10;Description automatically generated">
+            <a:extLst>
+              <a:ext uri="{FF2B5EF4-FFF2-40B4-BE49-F238E27FC236}">
+                <a16:creationId xmlns:a16="http://schemas.microsoft.com/office/drawing/2014/main" id="{193A0AEE-A52D-41EB-A821-AB8B6A781EE6}"/>
+              </a:ext>
+            </a:extLst>
+          </p:cNvPr>
+          <p:cNvPicPr>
+            <a:picLocks noGrp="1" noChangeAspect="1"/>
+          </p:cNvPicPr>
           <p:nvPr>
             <p:ph idx="1"/>
           </p:nvPr>
-        </p:nvSpPr>
-        <p:spPr/>
-        <p:txBody>
-          <a:bodyPr/>
-          <a:lstStyle/>
-          <a:p>
-            <a:endParaRPr lang="en-US" dirty="0"/>
-          </a:p>
-        </p:txBody>
-      </p:sp>
+        </p:nvPicPr>
+        <p:blipFill>
+          <a:blip r:embed="rId2">
+            <a:extLst>
+              <a:ext uri="{28A0092B-C50C-407E-A947-70E740481C1C}">
+                <a14:useLocalDpi xmlns:a14="http://schemas.microsoft.com/office/drawing/2010/main" val="0"/>
+              </a:ext>
+            </a:extLst>
+          </a:blip>
+          <a:stretch>
+            <a:fillRect/>
+          </a:stretch>
+        </p:blipFill>
+        <p:spPr>
+          <a:xfrm>
+            <a:off x="1306573" y="1097060"/>
+            <a:ext cx="5039724" cy="4334162"/>
+          </a:xfrm>
+          <a:prstGeom prst="rect">
+            <a:avLst/>
+          </a:prstGeom>
+        </p:spPr>
+      </p:pic>
+      <p:grpSp>
+        <p:nvGrpSpPr>
+          <p:cNvPr id="24" name="Group 23">
+            <a:extLst>
+              <a:ext uri="{FF2B5EF4-FFF2-40B4-BE49-F238E27FC236}">
+                <a16:creationId xmlns:a16="http://schemas.microsoft.com/office/drawing/2014/main" id="{34C85634-D5F5-4047-8F35-F4B1F50AB1A7}"/>
+              </a:ext>
+              <a:ext uri="{C183D7F6-B498-43B3-948B-1728B52AA6E4}">
+                <adec:decorative xmlns:adec="http://schemas.microsoft.com/office/drawing/2017/decorative" val="1"/>
+              </a:ext>
+            </a:extLst>
+          </p:cNvPr>
+          <p:cNvGrpSpPr>
+            <a:grpSpLocks noGrp="1" noUngrp="1" noRot="1" noChangeAspect="1" noMove="1" noResize="1"/>
+          </p:cNvGrpSpPr>
+          <p:nvPr>
+            <p:extLst>
+              <p:ext uri="{386F3935-93C4-4BCD-93E2-E3B085C9AB24}">
+                <p16:designElem xmlns:p16="http://schemas.microsoft.com/office/powerpoint/2015/main" val="1"/>
+              </p:ext>
+            </p:extLst>
+          </p:nvPr>
+        </p:nvGrpSpPr>
+        <p:grpSpPr>
+          <a:xfrm>
+            <a:off x="9206969" y="2963333"/>
+            <a:ext cx="2981858" cy="3208867"/>
+            <a:chOff x="9206969" y="2963333"/>
+            <a:chExt cx="2981858" cy="3208867"/>
+          </a:xfrm>
+        </p:grpSpPr>
+        <p:cxnSp>
+          <p:nvCxnSpPr>
+            <p:cNvPr id="25" name="Straight Connector 24">
+              <a:extLst>
+                <a:ext uri="{FF2B5EF4-FFF2-40B4-BE49-F238E27FC236}">
+                  <a16:creationId xmlns:a16="http://schemas.microsoft.com/office/drawing/2014/main" id="{1224BF71-948F-411D-AA79-8B2315715197}"/>
+                </a:ext>
+                <a:ext uri="{C183D7F6-B498-43B3-948B-1728B52AA6E4}">
+                  <adec:decorative xmlns:adec="http://schemas.microsoft.com/office/drawing/2017/decorative" val="1"/>
+                </a:ext>
+              </a:extLst>
+            </p:cNvPr>
+            <p:cNvCxnSpPr/>
+            <p:nvPr>
+              <p:extLst>
+                <p:ext uri="{386F3935-93C4-4BCD-93E2-E3B085C9AB24}">
+                  <p16:designElem xmlns:p16="http://schemas.microsoft.com/office/powerpoint/2015/main" val="1"/>
+                </p:ext>
+              </p:extLst>
+            </p:nvPr>
+          </p:nvCxnSpPr>
+          <p:spPr>
+            <a:xfrm flipH="1">
+              <a:off x="11276012" y="2963333"/>
+              <a:ext cx="912814" cy="912812"/>
+            </a:xfrm>
+            <a:prstGeom prst="line">
+              <a:avLst/>
+            </a:prstGeom>
+            <a:ln w="9525">
+              <a:solidFill>
+                <a:srgbClr val="FFFFFF"/>
+              </a:solidFill>
+            </a:ln>
+          </p:spPr>
+          <p:style>
+            <a:lnRef idx="2">
+              <a:schemeClr val="accent1"/>
+            </a:lnRef>
+            <a:fillRef idx="0">
+              <a:schemeClr val="accent1"/>
+            </a:fillRef>
+            <a:effectRef idx="1">
+              <a:schemeClr val="accent1"/>
+            </a:effectRef>
+            <a:fontRef idx="minor">
+              <a:schemeClr val="tx1"/>
+            </a:fontRef>
+          </p:style>
+        </p:cxnSp>
+        <p:cxnSp>
+          <p:nvCxnSpPr>
+            <p:cNvPr id="26" name="Straight Connector 25">
+              <a:extLst>
+                <a:ext uri="{FF2B5EF4-FFF2-40B4-BE49-F238E27FC236}">
+                  <a16:creationId xmlns:a16="http://schemas.microsoft.com/office/drawing/2014/main" id="{434B4526-E715-4199-A597-CD757CB4A026}"/>
+                </a:ext>
+                <a:ext uri="{C183D7F6-B498-43B3-948B-1728B52AA6E4}">
+                  <adec:decorative xmlns:adec="http://schemas.microsoft.com/office/drawing/2017/decorative" val="1"/>
+                </a:ext>
+              </a:extLst>
+            </p:cNvPr>
+            <p:cNvCxnSpPr/>
+            <p:nvPr>
+              <p:extLst>
+                <p:ext uri="{386F3935-93C4-4BCD-93E2-E3B085C9AB24}">
+                  <p16:designElem xmlns:p16="http://schemas.microsoft.com/office/powerpoint/2015/main" val="1"/>
+                </p:ext>
+              </p:extLst>
+            </p:nvPr>
+          </p:nvCxnSpPr>
+          <p:spPr>
+            <a:xfrm flipH="1">
+              <a:off x="9206969" y="3190344"/>
+              <a:ext cx="2981857" cy="2981856"/>
+            </a:xfrm>
+            <a:prstGeom prst="line">
+              <a:avLst/>
+            </a:prstGeom>
+            <a:ln w="9525">
+              <a:solidFill>
+                <a:srgbClr val="FFFFFF"/>
+              </a:solidFill>
+            </a:ln>
+          </p:spPr>
+          <p:style>
+            <a:lnRef idx="2">
+              <a:schemeClr val="accent1"/>
+            </a:lnRef>
+            <a:fillRef idx="0">
+              <a:schemeClr val="accent1"/>
+            </a:fillRef>
+            <a:effectRef idx="1">
+              <a:schemeClr val="accent1"/>
+            </a:effectRef>
+            <a:fontRef idx="minor">
+              <a:schemeClr val="tx1"/>
+            </a:fontRef>
+          </p:style>
+        </p:cxnSp>
+        <p:cxnSp>
+          <p:nvCxnSpPr>
+            <p:cNvPr id="27" name="Straight Connector 26">
+              <a:extLst>
+                <a:ext uri="{FF2B5EF4-FFF2-40B4-BE49-F238E27FC236}">
+                  <a16:creationId xmlns:a16="http://schemas.microsoft.com/office/drawing/2014/main" id="{35E295A6-48D5-4F9E-A32C-5D87EAA5E7E7}"/>
+                </a:ext>
+                <a:ext uri="{C183D7F6-B498-43B3-948B-1728B52AA6E4}">
+                  <adec:decorative xmlns:adec="http://schemas.microsoft.com/office/drawing/2017/decorative" val="1"/>
+                </a:ext>
+              </a:extLst>
+            </p:cNvPr>
+            <p:cNvCxnSpPr/>
+            <p:nvPr>
+              <p:extLst>
+                <p:ext uri="{386F3935-93C4-4BCD-93E2-E3B085C9AB24}">
+                  <p16:designElem xmlns:p16="http://schemas.microsoft.com/office/powerpoint/2015/main" val="1"/>
+                </p:ext>
+              </p:extLst>
+            </p:nvPr>
+          </p:nvCxnSpPr>
+          <p:spPr>
+            <a:xfrm flipH="1">
+              <a:off x="10292292" y="3285067"/>
+              <a:ext cx="1896534" cy="1896533"/>
+            </a:xfrm>
+            <a:prstGeom prst="line">
+              <a:avLst/>
+            </a:prstGeom>
+            <a:ln w="9525">
+              <a:solidFill>
+                <a:srgbClr val="FFFFFF"/>
+              </a:solidFill>
+            </a:ln>
+          </p:spPr>
+          <p:style>
+            <a:lnRef idx="2">
+              <a:schemeClr val="accent1"/>
+            </a:lnRef>
+            <a:fillRef idx="0">
+              <a:schemeClr val="accent1"/>
+            </a:fillRef>
+            <a:effectRef idx="1">
+              <a:schemeClr val="accent1"/>
+            </a:effectRef>
+            <a:fontRef idx="minor">
+              <a:schemeClr val="tx1"/>
+            </a:fontRef>
+          </p:style>
+        </p:cxnSp>
+        <p:cxnSp>
+          <p:nvCxnSpPr>
+            <p:cNvPr id="28" name="Straight Connector 27">
+              <a:extLst>
+                <a:ext uri="{FF2B5EF4-FFF2-40B4-BE49-F238E27FC236}">
+                  <a16:creationId xmlns:a16="http://schemas.microsoft.com/office/drawing/2014/main" id="{E10BF5B3-9260-4D36-BB24-07BC414B9D49}"/>
+                </a:ext>
+                <a:ext uri="{C183D7F6-B498-43B3-948B-1728B52AA6E4}">
+                  <adec:decorative xmlns:adec="http://schemas.microsoft.com/office/drawing/2017/decorative" val="1"/>
+                </a:ext>
+              </a:extLst>
+            </p:cNvPr>
+            <p:cNvCxnSpPr/>
+            <p:nvPr>
+              <p:extLst>
+                <p:ext uri="{386F3935-93C4-4BCD-93E2-E3B085C9AB24}">
+                  <p16:designElem xmlns:p16="http://schemas.microsoft.com/office/powerpoint/2015/main" val="1"/>
+                </p:ext>
+              </p:extLst>
+            </p:nvPr>
+          </p:nvCxnSpPr>
+          <p:spPr>
+            <a:xfrm flipH="1">
+              <a:off x="10443103" y="3131080"/>
+              <a:ext cx="1745722" cy="1745720"/>
+            </a:xfrm>
+            <a:prstGeom prst="line">
+              <a:avLst/>
+            </a:prstGeom>
+            <a:ln w="28575">
+              <a:solidFill>
+                <a:srgbClr val="FFFFFF"/>
+              </a:solidFill>
+            </a:ln>
+          </p:spPr>
+          <p:style>
+            <a:lnRef idx="2">
+              <a:schemeClr val="accent1"/>
+            </a:lnRef>
+            <a:fillRef idx="0">
+              <a:schemeClr val="accent1"/>
+            </a:fillRef>
+            <a:effectRef idx="1">
+              <a:schemeClr val="accent1"/>
+            </a:effectRef>
+            <a:fontRef idx="minor">
+              <a:schemeClr val="tx1"/>
+            </a:fontRef>
+          </p:style>
+        </p:cxnSp>
+        <p:cxnSp>
+          <p:nvCxnSpPr>
+            <p:cNvPr id="29" name="Straight Connector 28">
+              <a:extLst>
+                <a:ext uri="{FF2B5EF4-FFF2-40B4-BE49-F238E27FC236}">
+                  <a16:creationId xmlns:a16="http://schemas.microsoft.com/office/drawing/2014/main" id="{AAE0C886-FA2E-4E7C-BC00-8397AAEC865E}"/>
+                </a:ext>
+                <a:ext uri="{C183D7F6-B498-43B3-948B-1728B52AA6E4}">
+                  <adec:decorative xmlns:adec="http://schemas.microsoft.com/office/drawing/2017/decorative" val="1"/>
+                </a:ext>
+              </a:extLst>
+            </p:cNvPr>
+            <p:cNvCxnSpPr/>
+            <p:nvPr>
+              <p:extLst>
+                <p:ext uri="{386F3935-93C4-4BCD-93E2-E3B085C9AB24}">
+                  <p16:designElem xmlns:p16="http://schemas.microsoft.com/office/powerpoint/2015/main" val="1"/>
+                </p:ext>
+              </p:extLst>
+            </p:nvPr>
+          </p:nvCxnSpPr>
+          <p:spPr>
+            <a:xfrm flipH="1">
+              <a:off x="10918826" y="3683001"/>
+              <a:ext cx="1270001" cy="1269999"/>
+            </a:xfrm>
+            <a:prstGeom prst="line">
+              <a:avLst/>
+            </a:prstGeom>
+            <a:ln w="28575">
+              <a:solidFill>
+                <a:srgbClr val="FFFFFF"/>
+              </a:solidFill>
+            </a:ln>
+          </p:spPr>
+          <p:style>
+            <a:lnRef idx="2">
+              <a:schemeClr val="accent1"/>
+            </a:lnRef>
+            <a:fillRef idx="0">
+              <a:schemeClr val="accent1"/>
+            </a:fillRef>
+            <a:effectRef idx="1">
+              <a:schemeClr val="accent1"/>
+            </a:effectRef>
+            <a:fontRef idx="minor">
+              <a:schemeClr val="tx1"/>
+            </a:fontRef>
+          </p:style>
+        </p:cxnSp>
+      </p:grpSp>
     </p:spTree>
     <p:extLst>
       <p:ext uri="{BB962C8B-B14F-4D97-AF65-F5344CB8AC3E}">
@@ -14149,12 +15174,12 @@
     </p:extLst>
   </p:cSld>
   <p:clrMapOvr>
-    <a:masterClrMapping/>
+    <a:overrideClrMapping bg1="lt1" tx1="dk1" bg2="lt2" tx2="dk2" accent1="accent1" accent2="accent2" accent3="accent3" accent4="accent4" accent5="accent5" accent6="accent6" hlink="hlink" folHlink="folHlink"/>
   </p:clrMapOvr>
 </p:sld>
 </file>
 
-<file path=ppt/slides/slide9.xml><?xml version="1.0" encoding="utf-8"?>
+<file path=ppt/slides/slide8.xml><?xml version="1.0" encoding="utf-8"?>
 <p:sld xmlns:a="http://schemas.openxmlformats.org/drawingml/2006/main" xmlns:r="http://schemas.openxmlformats.org/officeDocument/2006/relationships" xmlns:p="http://schemas.openxmlformats.org/presentationml/2006/main">
   <p:cSld>
     <p:spTree>
@@ -14679,6 +15704,86 @@
     <p:extLst>
       <p:ext uri="{BB962C8B-B14F-4D97-AF65-F5344CB8AC3E}">
         <p14:creationId xmlns:p14="http://schemas.microsoft.com/office/powerpoint/2010/main" val="3063826701"/>
+      </p:ext>
+    </p:extLst>
+  </p:cSld>
+  <p:clrMapOvr>
+    <a:masterClrMapping/>
+  </p:clrMapOvr>
+</p:sld>
+</file>
+
+<file path=ppt/slides/slide9.xml><?xml version="1.0" encoding="utf-8"?>
+<p:sld xmlns:a="http://schemas.openxmlformats.org/drawingml/2006/main" xmlns:r="http://schemas.openxmlformats.org/officeDocument/2006/relationships" xmlns:p="http://schemas.openxmlformats.org/presentationml/2006/main">
+  <p:cSld>
+    <p:spTree>
+      <p:nvGrpSpPr>
+        <p:cNvPr id="1" name=""/>
+        <p:cNvGrpSpPr/>
+        <p:nvPr/>
+      </p:nvGrpSpPr>
+      <p:grpSpPr>
+        <a:xfrm>
+          <a:off x="0" y="0"/>
+          <a:ext cx="0" cy="0"/>
+          <a:chOff x="0" y="0"/>
+          <a:chExt cx="0" cy="0"/>
+        </a:xfrm>
+      </p:grpSpPr>
+      <p:sp>
+        <p:nvSpPr>
+          <p:cNvPr id="2" name="Title 1">
+            <a:extLst>
+              <a:ext uri="{FF2B5EF4-FFF2-40B4-BE49-F238E27FC236}">
+                <a16:creationId xmlns:a16="http://schemas.microsoft.com/office/drawing/2014/main" id="{F6E32B69-14D0-4469-B8AB-8F9BF4332538}"/>
+              </a:ext>
+            </a:extLst>
+          </p:cNvPr>
+          <p:cNvSpPr>
+            <a:spLocks noGrp="1"/>
+          </p:cNvSpPr>
+          <p:nvPr>
+            <p:ph type="title"/>
+          </p:nvPr>
+        </p:nvSpPr>
+        <p:spPr/>
+        <p:txBody>
+          <a:bodyPr/>
+          <a:lstStyle/>
+          <a:p>
+            <a:endParaRPr lang="en-US" dirty="0"/>
+          </a:p>
+        </p:txBody>
+      </p:sp>
+      <p:sp>
+        <p:nvSpPr>
+          <p:cNvPr id="3" name="Content Placeholder 2">
+            <a:extLst>
+              <a:ext uri="{FF2B5EF4-FFF2-40B4-BE49-F238E27FC236}">
+                <a16:creationId xmlns:a16="http://schemas.microsoft.com/office/drawing/2014/main" id="{B27FCFBC-1BB1-4D92-A0FD-5E2E2C7E0D2C}"/>
+              </a:ext>
+            </a:extLst>
+          </p:cNvPr>
+          <p:cNvSpPr>
+            <a:spLocks noGrp="1"/>
+          </p:cNvSpPr>
+          <p:nvPr>
+            <p:ph idx="1"/>
+          </p:nvPr>
+        </p:nvSpPr>
+        <p:spPr/>
+        <p:txBody>
+          <a:bodyPr/>
+          <a:lstStyle/>
+          <a:p>
+            <a:endParaRPr lang="en-US"/>
+          </a:p>
+        </p:txBody>
+      </p:sp>
+    </p:spTree>
+    <p:extLst>
+      <p:ext uri="{BB962C8B-B14F-4D97-AF65-F5344CB8AC3E}">
+        <p14:creationId xmlns:p14="http://schemas.microsoft.com/office/powerpoint/2010/main" val="3232827333"/>
       </p:ext>
     </p:extLst>
   </p:cSld>
@@ -14960,4 +16065,299 @@
     </a:ext>
   </a:extLst>
 </a:theme>
+</file>
+
+<file path=ppt/theme/theme2.xml><?xml version="1.0" encoding="utf-8"?>
+<a:theme xmlns:a="http://schemas.openxmlformats.org/drawingml/2006/main" name="Office Theme">
+  <a:themeElements>
+    <a:clrScheme name="Office">
+      <a:dk1>
+        <a:sysClr val="windowText" lastClr="000000"/>
+      </a:dk1>
+      <a:lt1>
+        <a:sysClr val="window" lastClr="FFFFFF"/>
+      </a:lt1>
+      <a:dk2>
+        <a:srgbClr val="44546A"/>
+      </a:dk2>
+      <a:lt2>
+        <a:srgbClr val="E7E6E6"/>
+      </a:lt2>
+      <a:accent1>
+        <a:srgbClr val="4472C4"/>
+      </a:accent1>
+      <a:accent2>
+        <a:srgbClr val="ED7D31"/>
+      </a:accent2>
+      <a:accent3>
+        <a:srgbClr val="A5A5A5"/>
+      </a:accent3>
+      <a:accent4>
+        <a:srgbClr val="FFC000"/>
+      </a:accent4>
+      <a:accent5>
+        <a:srgbClr val="5B9BD5"/>
+      </a:accent5>
+      <a:accent6>
+        <a:srgbClr val="70AD47"/>
+      </a:accent6>
+      <a:hlink>
+        <a:srgbClr val="0563C1"/>
+      </a:hlink>
+      <a:folHlink>
+        <a:srgbClr val="954F72"/>
+      </a:folHlink>
+    </a:clrScheme>
+    <a:fontScheme name="Office">
+      <a:majorFont>
+        <a:latin typeface="Calibri Light" panose="020F0302020204030204"/>
+        <a:ea typeface=""/>
+        <a:cs typeface=""/>
+        <a:font script="Jpan" typeface="游ゴシック Light"/>
+        <a:font script="Hang" typeface="맑은 고딕"/>
+        <a:font script="Hans" typeface="等线 Light"/>
+        <a:font script="Hant" typeface="新細明體"/>
+        <a:font script="Arab" typeface="Times New Roman"/>
+        <a:font script="Hebr" typeface="Times New Roman"/>
+        <a:font script="Thai" typeface="Angsana New"/>
+        <a:font script="Ethi" typeface="Nyala"/>
+        <a:font script="Beng" typeface="Vrinda"/>
+        <a:font script="Gujr" typeface="Shruti"/>
+        <a:font script="Khmr" typeface="MoolBoran"/>
+        <a:font script="Knda" typeface="Tunga"/>
+        <a:font script="Guru" typeface="Raavi"/>
+        <a:font script="Cans" typeface="Euphemia"/>
+        <a:font script="Cher" typeface="Plantagenet Cherokee"/>
+        <a:font script="Yiii" typeface="Microsoft Yi Baiti"/>
+        <a:font script="Tibt" typeface="Microsoft Himalaya"/>
+        <a:font script="Thaa" typeface="MV Boli"/>
+        <a:font script="Deva" typeface="Mangal"/>
+        <a:font script="Telu" typeface="Gautami"/>
+        <a:font script="Taml" typeface="Latha"/>
+        <a:font script="Syrc" typeface="Estrangelo Edessa"/>
+        <a:font script="Orya" typeface="Kalinga"/>
+        <a:font script="Mlym" typeface="Kartika"/>
+        <a:font script="Laoo" typeface="DokChampa"/>
+        <a:font script="Sinh" typeface="Iskoola Pota"/>
+        <a:font script="Mong" typeface="Mongolian Baiti"/>
+        <a:font script="Viet" typeface="Times New Roman"/>
+        <a:font script="Uigh" typeface="Microsoft Uighur"/>
+        <a:font script="Geor" typeface="Sylfaen"/>
+        <a:font script="Armn" typeface="Arial"/>
+        <a:font script="Bugi" typeface="Leelawadee UI"/>
+        <a:font script="Bopo" typeface="Microsoft JhengHei"/>
+        <a:font script="Java" typeface="Javanese Text"/>
+        <a:font script="Lisu" typeface="Segoe UI"/>
+        <a:font script="Mymr" typeface="Myanmar Text"/>
+        <a:font script="Nkoo" typeface="Ebrima"/>
+        <a:font script="Olck" typeface="Nirmala UI"/>
+        <a:font script="Osma" typeface="Ebrima"/>
+        <a:font script="Phag" typeface="Phagspa"/>
+        <a:font script="Syrn" typeface="Estrangelo Edessa"/>
+        <a:font script="Syrj" typeface="Estrangelo Edessa"/>
+        <a:font script="Syre" typeface="Estrangelo Edessa"/>
+        <a:font script="Sora" typeface="Nirmala UI"/>
+        <a:font script="Tale" typeface="Microsoft Tai Le"/>
+        <a:font script="Talu" typeface="Microsoft New Tai Lue"/>
+        <a:font script="Tfng" typeface="Ebrima"/>
+      </a:majorFont>
+      <a:minorFont>
+        <a:latin typeface="Calibri" panose="020F0502020204030204"/>
+        <a:ea typeface=""/>
+        <a:cs typeface=""/>
+        <a:font script="Jpan" typeface="游ゴシック"/>
+        <a:font script="Hang" typeface="맑은 고딕"/>
+        <a:font script="Hans" typeface="等线"/>
+        <a:font script="Hant" typeface="新細明體"/>
+        <a:font script="Arab" typeface="Arial"/>
+        <a:font script="Hebr" typeface="Arial"/>
+        <a:font script="Thai" typeface="Cordia New"/>
+        <a:font script="Ethi" typeface="Nyala"/>
+        <a:font script="Beng" typeface="Vrinda"/>
+        <a:font script="Gujr" typeface="Shruti"/>
+        <a:font script="Khmr" typeface="DaunPenh"/>
+        <a:font script="Knda" typeface="Tunga"/>
+        <a:font script="Guru" typeface="Raavi"/>
+        <a:font script="Cans" typeface="Euphemia"/>
+        <a:font script="Cher" typeface="Plantagenet Cherokee"/>
+        <a:font script="Yiii" typeface="Microsoft Yi Baiti"/>
+        <a:font script="Tibt" typeface="Microsoft Himalaya"/>
+        <a:font script="Thaa" typeface="MV Boli"/>
+        <a:font script="Deva" typeface="Mangal"/>
+        <a:font script="Telu" typeface="Gautami"/>
+        <a:font script="Taml" typeface="Latha"/>
+        <a:font script="Syrc" typeface="Estrangelo Edessa"/>
+        <a:font script="Orya" typeface="Kalinga"/>
+        <a:font script="Mlym" typeface="Kartika"/>
+        <a:font script="Laoo" typeface="DokChampa"/>
+        <a:font script="Sinh" typeface="Iskoola Pota"/>
+        <a:font script="Mong" typeface="Mongolian Baiti"/>
+        <a:font script="Viet" typeface="Arial"/>
+        <a:font script="Uigh" typeface="Microsoft Uighur"/>
+        <a:font script="Geor" typeface="Sylfaen"/>
+        <a:font script="Armn" typeface="Arial"/>
+        <a:font script="Bugi" typeface="Leelawadee UI"/>
+        <a:font script="Bopo" typeface="Microsoft JhengHei"/>
+        <a:font script="Java" typeface="Javanese Text"/>
+        <a:font script="Lisu" typeface="Segoe UI"/>
+        <a:font script="Mymr" typeface="Myanmar Text"/>
+        <a:font script="Nkoo" typeface="Ebrima"/>
+        <a:font script="Olck" typeface="Nirmala UI"/>
+        <a:font script="Osma" typeface="Ebrima"/>
+        <a:font script="Phag" typeface="Phagspa"/>
+        <a:font script="Syrn" typeface="Estrangelo Edessa"/>
+        <a:font script="Syrj" typeface="Estrangelo Edessa"/>
+        <a:font script="Syre" typeface="Estrangelo Edessa"/>
+        <a:font script="Sora" typeface="Nirmala UI"/>
+        <a:font script="Tale" typeface="Microsoft Tai Le"/>
+        <a:font script="Talu" typeface="Microsoft New Tai Lue"/>
+        <a:font script="Tfng" typeface="Ebrima"/>
+      </a:minorFont>
+    </a:fontScheme>
+    <a:fmtScheme name="Office">
+      <a:fillStyleLst>
+        <a:solidFill>
+          <a:schemeClr val="phClr"/>
+        </a:solidFill>
+        <a:gradFill rotWithShape="1">
+          <a:gsLst>
+            <a:gs pos="0">
+              <a:schemeClr val="phClr">
+                <a:lumMod val="110000"/>
+                <a:satMod val="105000"/>
+                <a:tint val="67000"/>
+              </a:schemeClr>
+            </a:gs>
+            <a:gs pos="50000">
+              <a:schemeClr val="phClr">
+                <a:lumMod val="105000"/>
+                <a:satMod val="103000"/>
+                <a:tint val="73000"/>
+              </a:schemeClr>
+            </a:gs>
+            <a:gs pos="100000">
+              <a:schemeClr val="phClr">
+                <a:lumMod val="105000"/>
+                <a:satMod val="109000"/>
+                <a:tint val="81000"/>
+              </a:schemeClr>
+            </a:gs>
+          </a:gsLst>
+          <a:lin ang="5400000" scaled="0"/>
+        </a:gradFill>
+        <a:gradFill rotWithShape="1">
+          <a:gsLst>
+            <a:gs pos="0">
+              <a:schemeClr val="phClr">
+                <a:satMod val="103000"/>
+                <a:lumMod val="102000"/>
+                <a:tint val="94000"/>
+              </a:schemeClr>
+            </a:gs>
+            <a:gs pos="50000">
+              <a:schemeClr val="phClr">
+                <a:satMod val="110000"/>
+                <a:lumMod val="100000"/>
+                <a:shade val="100000"/>
+              </a:schemeClr>
+            </a:gs>
+            <a:gs pos="100000">
+              <a:schemeClr val="phClr">
+                <a:lumMod val="99000"/>
+                <a:satMod val="120000"/>
+                <a:shade val="78000"/>
+              </a:schemeClr>
+            </a:gs>
+          </a:gsLst>
+          <a:lin ang="5400000" scaled="0"/>
+        </a:gradFill>
+      </a:fillStyleLst>
+      <a:lnStyleLst>
+        <a:ln w="6350" cap="flat" cmpd="sng" algn="ctr">
+          <a:solidFill>
+            <a:schemeClr val="phClr"/>
+          </a:solidFill>
+          <a:prstDash val="solid"/>
+          <a:miter lim="800000"/>
+        </a:ln>
+        <a:ln w="12700" cap="flat" cmpd="sng" algn="ctr">
+          <a:solidFill>
+            <a:schemeClr val="phClr"/>
+          </a:solidFill>
+          <a:prstDash val="solid"/>
+          <a:miter lim="800000"/>
+        </a:ln>
+        <a:ln w="19050" cap="flat" cmpd="sng" algn="ctr">
+          <a:solidFill>
+            <a:schemeClr val="phClr"/>
+          </a:solidFill>
+          <a:prstDash val="solid"/>
+          <a:miter lim="800000"/>
+        </a:ln>
+      </a:lnStyleLst>
+      <a:effectStyleLst>
+        <a:effectStyle>
+          <a:effectLst/>
+        </a:effectStyle>
+        <a:effectStyle>
+          <a:effectLst/>
+        </a:effectStyle>
+        <a:effectStyle>
+          <a:effectLst>
+            <a:outerShdw blurRad="57150" dist="19050" dir="5400000" algn="ctr" rotWithShape="0">
+              <a:srgbClr val="000000">
+                <a:alpha val="63000"/>
+              </a:srgbClr>
+            </a:outerShdw>
+          </a:effectLst>
+        </a:effectStyle>
+      </a:effectStyleLst>
+      <a:bgFillStyleLst>
+        <a:solidFill>
+          <a:schemeClr val="phClr"/>
+        </a:solidFill>
+        <a:solidFill>
+          <a:schemeClr val="phClr">
+            <a:tint val="95000"/>
+            <a:satMod val="170000"/>
+          </a:schemeClr>
+        </a:solidFill>
+        <a:gradFill rotWithShape="1">
+          <a:gsLst>
+            <a:gs pos="0">
+              <a:schemeClr val="phClr">
+                <a:tint val="93000"/>
+                <a:satMod val="150000"/>
+                <a:shade val="98000"/>
+                <a:lumMod val="102000"/>
+              </a:schemeClr>
+            </a:gs>
+            <a:gs pos="50000">
+              <a:schemeClr val="phClr">
+                <a:tint val="98000"/>
+                <a:satMod val="130000"/>
+                <a:shade val="90000"/>
+                <a:lumMod val="103000"/>
+              </a:schemeClr>
+            </a:gs>
+            <a:gs pos="100000">
+              <a:schemeClr val="phClr">
+                <a:shade val="63000"/>
+                <a:satMod val="120000"/>
+              </a:schemeClr>
+            </a:gs>
+          </a:gsLst>
+          <a:lin ang="5400000" scaled="0"/>
+        </a:gradFill>
+      </a:bgFillStyleLst>
+    </a:fmtScheme>
+  </a:themeElements>
+  <a:objectDefaults/>
+  <a:extraClrSchemeLst/>
+  <a:extLst>
+    <a:ext uri="{05A4C25C-085E-4340-85A3-A5531E510DB2}">
+      <thm15:themeFamily xmlns:thm15="http://schemas.microsoft.com/office/thememl/2012/main" name="Office Theme" id="{62F939B6-93AF-4DB8-9C6B-D6C7DFDC589F}" vid="{4A3C46E8-61CC-4603-A589-7422A47A8E4A}"/>
+    </a:ext>
+  </a:extLst>
+</a:theme>
 </file>
</xml_diff>

<commit_message>
report and presentation update
</commit_message>
<xml_diff>
--- a/report/Presentation.pptx
+++ b/report/Presentation.pptx
@@ -16,8 +16,8 @@
     <p:sldId id="261" r:id="rId7"/>
     <p:sldId id="262" r:id="rId8"/>
     <p:sldId id="256" r:id="rId9"/>
-    <p:sldId id="263" r:id="rId10"/>
-    <p:sldId id="264" r:id="rId11"/>
+    <p:sldId id="266" r:id="rId10"/>
+    <p:sldId id="263" r:id="rId11"/>
   </p:sldIdLst>
   <p:sldSz cx="12192000" cy="6858000"/>
   <p:notesSz cx="6858000" cy="9144000"/>
@@ -6213,6 +6213,56 @@
           <a:bodyPr/>
           <a:lstStyle/>
           <a:p>
+            <a:r>
+              <a:rPr lang="en-US" dirty="0"/>
+              <a:t>This video presentation is for EE583 PR project. </a:t>
+            </a:r>
+          </a:p>
+          <a:p>
+            <a:r>
+              <a:rPr lang="en-US" dirty="0"/>
+              <a:t>In this project I have analyzed the paper </a:t>
+            </a:r>
+            <a:r>
+              <a:rPr lang="en-US" i="1" dirty="0"/>
+              <a:t>Deep Multilayer </a:t>
+            </a:r>
+            <a:r>
+              <a:rPr lang="en-US" i="1" dirty="0" err="1"/>
+              <a:t>Perceptrons</a:t>
+            </a:r>
+            <a:r>
+              <a:rPr lang="en-US" i="1" dirty="0"/>
+              <a:t> for Dimensional</a:t>
+            </a:r>
+            <a:br>
+              <a:rPr lang="en-US" i="1" dirty="0"/>
+            </a:br>
+            <a:r>
+              <a:rPr lang="en-US" i="1" dirty="0"/>
+              <a:t>Speech Emotion Recognition , which is published as </a:t>
+            </a:r>
+            <a:r>
+              <a:rPr lang="en-US" i="1"/>
+              <a:t>a proceedings </a:t>
+            </a:r>
+            <a:r>
+              <a:rPr lang="en-US" i="1" dirty="0"/>
+              <a:t>paper in </a:t>
+            </a:r>
+            <a:r>
+              <a:rPr lang="en-US" b="0" i="0" dirty="0">
+                <a:solidFill>
+                  <a:srgbClr val="BDC1C6"/>
+                </a:solidFill>
+                <a:effectLst/>
+                <a:latin typeface="arial" panose="020B0604020202020204" pitchFamily="34" charset="0"/>
+              </a:rPr>
+              <a:t>Asia-Pacific Signal and Information Processing Association Annual Summit</a:t>
+            </a:r>
+            <a:endParaRPr lang="en-US" i="1" dirty="0"/>
+          </a:p>
+          <a:p>
             <a:endParaRPr lang="en-US" dirty="0"/>
           </a:p>
         </p:txBody>
@@ -6299,7 +6349,7 @@
           <a:p>
             <a:r>
               <a:rPr lang="en-US" dirty="0"/>
-              <a:t>Traditional scheme where the categorical labels such as joy and anger are utilized for classification. Researcher of this, on the other hand, utilize the dimensional emotions and convert this problem to more of a regression one . </a:t>
+              <a:t>Traditional scheme where the categorical labels such as joy and anger are utilized for classification. Researchers of this paper, on the other hand, utilize the dimensional emotions and convert this problem into more of a regression one . </a:t>
             </a:r>
           </a:p>
         </p:txBody>
@@ -6386,6 +6436,12 @@
           <a:p>
             <a:r>
               <a:rPr lang="en-US" dirty="0"/>
+              <a:t>So how did they do that, numerical labels are needed in this regression problem</a:t>
+            </a:r>
+          </a:p>
+          <a:p>
+            <a:r>
+              <a:rPr lang="en-US" dirty="0"/>
               <a:t>Russel argued in his 1979 paper that the emotions have representations in 3 dimension, being Valence, Arousal and Dominance.</a:t>
             </a:r>
           </a:p>
@@ -6504,15 +6560,7 @@
           <a:p>
             <a:r>
               <a:rPr lang="en-US" dirty="0"/>
-              <a:t>Although both datasets include extra data such as video and text, only </a:t>
-            </a:r>
-            <a:r>
-              <a:rPr lang="en-US" dirty="0" err="1"/>
-              <a:t>audi</a:t>
-            </a:r>
-            <a:r>
-              <a:rPr lang="en-US" dirty="0"/>
-              <a:t> data was utilized.</a:t>
+              <a:t>Although both datasets include extra data such as video and text, only audio data was utilized.</a:t>
             </a:r>
           </a:p>
           <a:p>
@@ -6651,7 +6699,7 @@
           <a:p>
             <a:r>
               <a:rPr lang="en-US" dirty="0"/>
-              <a:t>The silence is obtained as the ratio of silent frames in total frames. </a:t>
+              <a:t>The silence is obtained as the ratio of silent frames by the number of total frames. </a:t>
             </a:r>
           </a:p>
         </p:txBody>
@@ -6842,6 +6890,90 @@
             <a:fld id="{14AC118C-48E1-4114-9041-6A465FDC6B30}" type="slidenum">
               <a:rPr lang="en-US" smtClean="0"/>
               <a:t>9</a:t>
+            </a:fld>
+            <a:endParaRPr lang="en-US"/>
+          </a:p>
+        </p:txBody>
+      </p:sp>
+    </p:spTree>
+    <p:extLst>
+      <p:ext uri="{BB962C8B-B14F-4D97-AF65-F5344CB8AC3E}">
+        <p14:creationId xmlns:p14="http://schemas.microsoft.com/office/powerpoint/2010/main" val="3039124653"/>
+      </p:ext>
+    </p:extLst>
+  </p:cSld>
+  <p:clrMapOvr>
+    <a:masterClrMapping/>
+  </p:clrMapOvr>
+</p:notes>
+</file>
+
+<file path=ppt/notesSlides/notesSlide8.xml><?xml version="1.0" encoding="utf-8"?>
+<p:notes xmlns:a="http://schemas.openxmlformats.org/drawingml/2006/main" xmlns:r="http://schemas.openxmlformats.org/officeDocument/2006/relationships" xmlns:p="http://schemas.openxmlformats.org/presentationml/2006/main">
+  <p:cSld>
+    <p:spTree>
+      <p:nvGrpSpPr>
+        <p:cNvPr id="1" name=""/>
+        <p:cNvGrpSpPr/>
+        <p:nvPr/>
+      </p:nvGrpSpPr>
+      <p:grpSpPr>
+        <a:xfrm>
+          <a:off x="0" y="0"/>
+          <a:ext cx="0" cy="0"/>
+          <a:chOff x="0" y="0"/>
+          <a:chExt cx="0" cy="0"/>
+        </a:xfrm>
+      </p:grpSpPr>
+      <p:sp>
+        <p:nvSpPr>
+          <p:cNvPr id="2" name="Slide Image Placeholder 1"/>
+          <p:cNvSpPr>
+            <a:spLocks noGrp="1" noRot="1" noChangeAspect="1"/>
+          </p:cNvSpPr>
+          <p:nvPr>
+            <p:ph type="sldImg"/>
+          </p:nvPr>
+        </p:nvSpPr>
+        <p:spPr/>
+      </p:sp>
+      <p:sp>
+        <p:nvSpPr>
+          <p:cNvPr id="3" name="Notes Placeholder 2"/>
+          <p:cNvSpPr>
+            <a:spLocks noGrp="1"/>
+          </p:cNvSpPr>
+          <p:nvPr>
+            <p:ph type="body" idx="1"/>
+          </p:nvPr>
+        </p:nvSpPr>
+        <p:spPr/>
+        <p:txBody>
+          <a:bodyPr/>
+          <a:lstStyle/>
+          <a:p>
+            <a:endParaRPr lang="en-US" dirty="0"/>
+          </a:p>
+        </p:txBody>
+      </p:sp>
+      <p:sp>
+        <p:nvSpPr>
+          <p:cNvPr id="4" name="Slide Number Placeholder 3"/>
+          <p:cNvSpPr>
+            <a:spLocks noGrp="1"/>
+          </p:cNvSpPr>
+          <p:nvPr>
+            <p:ph type="sldNum" sz="quarter" idx="5"/>
+          </p:nvPr>
+        </p:nvSpPr>
+        <p:spPr/>
+        <p:txBody>
+          <a:bodyPr/>
+          <a:lstStyle/>
+          <a:p>
+            <a:fld id="{14AC118C-48E1-4114-9041-6A465FDC6B30}" type="slidenum">
+              <a:rPr lang="en-US" smtClean="0"/>
+              <a:t>10</a:t>
             </a:fld>
             <a:endParaRPr lang="en-US"/>
           </a:p>
@@ -12241,60 +12373,66 @@
           <a:chExt cx="0" cy="0"/>
         </a:xfrm>
       </p:grpSpPr>
-      <p:sp>
-        <p:nvSpPr>
-          <p:cNvPr id="2" name="Title 1">
+      <p:graphicFrame>
+        <p:nvGraphicFramePr>
+          <p:cNvPr id="7" name="Content Placeholder 2">
             <a:extLst>
               <a:ext uri="{FF2B5EF4-FFF2-40B4-BE49-F238E27FC236}">
-                <a16:creationId xmlns:a16="http://schemas.microsoft.com/office/drawing/2014/main" id="{F6E32B69-14D0-4469-B8AB-8F9BF4332538}"/>
+                <a16:creationId xmlns:a16="http://schemas.microsoft.com/office/drawing/2014/main" id="{FF430FC3-7DC9-4CF2-B24E-0787C027CE87}"/>
               </a:ext>
             </a:extLst>
           </p:cNvPr>
-          <p:cNvSpPr>
-            <a:spLocks noGrp="1"/>
-          </p:cNvSpPr>
+          <p:cNvGraphicFramePr>
+            <a:graphicFrameLocks noGrp="1"/>
+          </p:cNvGraphicFramePr>
           <p:nvPr>
-            <p:ph type="title"/>
+            <p:ph idx="1"/>
           </p:nvPr>
-        </p:nvSpPr>
-        <p:spPr/>
-        <p:txBody>
-          <a:bodyPr/>
-          <a:lstStyle/>
-          <a:p>
-            <a:endParaRPr lang="en-US" dirty="0"/>
-          </a:p>
-        </p:txBody>
-      </p:sp>
-      <p:sp>
-        <p:nvSpPr>
-          <p:cNvPr id="3" name="Content Placeholder 2">
+        </p:nvGraphicFramePr>
+        <p:xfrm>
+          <a:off x="259702" y="3765415"/>
+          <a:ext cx="11672596" cy="2933965"/>
+        </p:xfrm>
+        <a:graphic>
+          <a:graphicData uri="http://schemas.openxmlformats.org/drawingml/2006/diagram">
+            <dgm:relIds xmlns:dgm="http://schemas.openxmlformats.org/drawingml/2006/diagram" xmlns:r="http://schemas.openxmlformats.org/officeDocument/2006/relationships" r:dm="rId3" r:lo="rId4" r:qs="rId5" r:cs="rId6"/>
+          </a:graphicData>
+        </a:graphic>
+      </p:graphicFrame>
+      <p:pic>
+        <p:nvPicPr>
+          <p:cNvPr id="3" name="Picture 2">
             <a:extLst>
               <a:ext uri="{FF2B5EF4-FFF2-40B4-BE49-F238E27FC236}">
-                <a16:creationId xmlns:a16="http://schemas.microsoft.com/office/drawing/2014/main" id="{B27FCFBC-1BB1-4D92-A0FD-5E2E2C7E0D2C}"/>
+                <a16:creationId xmlns:a16="http://schemas.microsoft.com/office/drawing/2014/main" id="{AE55D0E7-DD41-4EC3-8A2C-8D7EC4E170DE}"/>
               </a:ext>
             </a:extLst>
           </p:cNvPr>
-          <p:cNvSpPr>
-            <a:spLocks noGrp="1"/>
-          </p:cNvSpPr>
-          <p:nvPr>
-            <p:ph idx="1"/>
-          </p:nvPr>
-        </p:nvSpPr>
-        <p:spPr/>
-        <p:txBody>
-          <a:bodyPr/>
-          <a:lstStyle/>
-          <a:p>
-            <a:endParaRPr lang="en-US"/>
-          </a:p>
-        </p:txBody>
-      </p:sp>
+          <p:cNvPicPr>
+            <a:picLocks noChangeAspect="1"/>
+          </p:cNvPicPr>
+          <p:nvPr/>
+        </p:nvPicPr>
+        <p:blipFill>
+          <a:blip r:embed="rId8"/>
+          <a:stretch>
+            <a:fillRect/>
+          </a:stretch>
+        </p:blipFill>
+        <p:spPr>
+          <a:xfrm>
+            <a:off x="1175459" y="76667"/>
+            <a:ext cx="9841081" cy="4161609"/>
+          </a:xfrm>
+          <a:prstGeom prst="rect">
+            <a:avLst/>
+          </a:prstGeom>
+        </p:spPr>
+      </p:pic>
     </p:spTree>
     <p:extLst>
       <p:ext uri="{BB962C8B-B14F-4D97-AF65-F5344CB8AC3E}">
-        <p14:creationId xmlns:p14="http://schemas.microsoft.com/office/powerpoint/2010/main" val="3232827333"/>
+        <p14:creationId xmlns:p14="http://schemas.microsoft.com/office/powerpoint/2010/main" val="3809881936"/>
       </p:ext>
     </p:extLst>
   </p:cSld>
@@ -13005,9 +13143,10 @@
           <a:lstStyle/>
           <a:p>
             <a:r>
-              <a:rPr lang="en-US" sz="2800" dirty="0"/>
+              <a:rPr lang="en-US" sz="2800"/>
               <a:t>DIMENSIONAL EMOTIONS</a:t>
             </a:r>
+            <a:endParaRPr lang="en-US" sz="2800" dirty="0"/>
           </a:p>
         </p:txBody>
       </p:sp>
@@ -13086,7 +13225,7 @@
       </p:sp>
       <p:pic>
         <p:nvPicPr>
-          <p:cNvPr id="5" name="Content Placeholder 4" descr="Chart&#10;&#10;Description automatically generated">
+          <p:cNvPr id="5" name="Content Placeholder 4">
             <a:extLst>
               <a:ext uri="{FF2B5EF4-FFF2-40B4-BE49-F238E27FC236}">
                 <a16:creationId xmlns:a16="http://schemas.microsoft.com/office/drawing/2014/main" id="{4FFFB224-DABF-42D2-A95A-70ECD14137C3}"/>
@@ -13098,7 +13237,7 @@
           </p:cNvPicPr>
           <p:nvPr/>
         </p:nvPicPr>
-        <p:blipFill rotWithShape="1">
+        <p:blipFill>
           <a:blip r:embed="rId3">
             <a:extLst>
               <a:ext uri="{28A0092B-C50C-407E-A947-70E740481C1C}">
@@ -13106,13 +13245,13 @@
               </a:ext>
             </a:extLst>
           </a:blip>
-          <a:srcRect l="99" r="7596" b="1"/>
+          <a:srcRect l="4434" r="4434"/>
           <a:stretch/>
         </p:blipFill>
         <p:spPr>
           <a:xfrm>
             <a:off x="778062" y="786117"/>
-            <a:ext cx="6245352" cy="4956048"/>
+            <a:ext cx="6166748" cy="4956048"/>
           </a:xfrm>
           <a:custGeom>
             <a:avLst/>
@@ -13146,38 +13285,41 @@
           </a:custGeom>
         </p:spPr>
       </p:pic>
-      <p:sp>
-        <p:nvSpPr>
-          <p:cNvPr id="9" name="Content Placeholder 8">
+      <p:pic>
+        <p:nvPicPr>
+          <p:cNvPr id="4" name="Content Placeholder 3" descr="Table&#10;&#10;Description automatically generated">
             <a:extLst>
               <a:ext uri="{FF2B5EF4-FFF2-40B4-BE49-F238E27FC236}">
-                <a16:creationId xmlns:a16="http://schemas.microsoft.com/office/drawing/2014/main" id="{E5146BCA-5345-4A4B-92E3-BD1F74DC7F0E}"/>
+                <a16:creationId xmlns:a16="http://schemas.microsoft.com/office/drawing/2014/main" id="{2F4F7373-6A8F-478E-92C3-38AB67990196}"/>
               </a:ext>
             </a:extLst>
           </p:cNvPr>
-          <p:cNvSpPr>
-            <a:spLocks noGrp="1"/>
-          </p:cNvSpPr>
+          <p:cNvPicPr>
+            <a:picLocks noGrp="1" noChangeAspect="1"/>
+          </p:cNvPicPr>
           <p:nvPr>
             <p:ph idx="1"/>
           </p:nvPr>
-        </p:nvSpPr>
+        </p:nvPicPr>
+        <p:blipFill>
+          <a:blip r:embed="rId4">
+            <a:extLst>
+              <a:ext uri="{28A0092B-C50C-407E-A947-70E740481C1C}">
+                <a14:useLocalDpi xmlns:a14="http://schemas.microsoft.com/office/drawing/2010/main" val="0"/>
+              </a:ext>
+            </a:extLst>
+          </a:blip>
+          <a:stretch>
+            <a:fillRect/>
+          </a:stretch>
+        </p:blipFill>
         <p:spPr>
           <a:xfrm>
-            <a:off x="7532710" y="1822449"/>
-            <a:ext cx="3479419" cy="3070226"/>
+            <a:off x="7532688" y="2209465"/>
+            <a:ext cx="3479800" cy="2296194"/>
           </a:xfrm>
         </p:spPr>
-        <p:txBody>
-          <a:bodyPr anchor="t">
-            <a:normAutofit/>
-          </a:bodyPr>
-          <a:lstStyle/>
-          <a:p>
-            <a:endParaRPr lang="en-US" sz="1400"/>
-          </a:p>
-        </p:txBody>
-      </p:sp>
+      </p:pic>
       <p:grpSp>
         <p:nvGrpSpPr>
           <p:cNvPr id="16" name="Group 15">
@@ -13488,6 +13630,7 @@
           </a:bodyPr>
           <a:lstStyle/>
           <a:p>
+            <a:pPr algn="ctr"/>
             <a:r>
               <a:rPr lang="en-US" dirty="0"/>
               <a:t>Figure 2. Emotions in VAD Space</a:t>
@@ -14887,8 +15030,8 @@
             </p:sp>
           </mc:Fallback>
         </mc:AlternateContent>
-        <mc:AlternateContent xmlns:mc="http://schemas.openxmlformats.org/markup-compatibility/2006">
-          <mc:Choice xmlns:a14="http://schemas.microsoft.com/office/drawing/2010/main" Requires="a14">
+        <mc:AlternateContent xmlns:mc="http://schemas.openxmlformats.org/markup-compatibility/2006" xmlns:a14="http://schemas.microsoft.com/office/drawing/2010/main">
+          <mc:Choice Requires="a14">
             <p:sp>
               <p:nvSpPr>
                 <p:cNvPr id="9" name="TextBox 8">
@@ -15043,7 +15186,7 @@
               </p:txBody>
             </p:sp>
           </mc:Choice>
-          <mc:Fallback>
+          <mc:Fallback xmlns="">
             <p:sp>
               <p:nvSpPr>
                 <p:cNvPr id="9" name="TextBox 8">
@@ -16508,6 +16651,14 @@
 <file path=ppt/slides/slide9.xml><?xml version="1.0" encoding="utf-8"?>
 <p:sld xmlns:a="http://schemas.openxmlformats.org/drawingml/2006/main" xmlns:r="http://schemas.openxmlformats.org/officeDocument/2006/relationships" xmlns:p="http://schemas.openxmlformats.org/presentationml/2006/main">
   <p:cSld>
+    <p:bg>
+      <p:bgPr>
+        <a:solidFill>
+          <a:schemeClr val="bg1"/>
+        </a:solidFill>
+        <a:effectLst/>
+      </p:bgPr>
+    </p:bg>
     <p:spTree>
       <p:nvGrpSpPr>
         <p:cNvPr id="1" name=""/>
@@ -16522,38 +16673,765 @@
           <a:chExt cx="0" cy="0"/>
         </a:xfrm>
       </p:grpSpPr>
-      <p:graphicFrame>
-        <p:nvGraphicFramePr>
-          <p:cNvPr id="7" name="Content Placeholder 2">
+      <p:cxnSp>
+        <p:nvCxnSpPr>
+          <p:cNvPr id="10" name="Straight Connector 9">
             <a:extLst>
               <a:ext uri="{FF2B5EF4-FFF2-40B4-BE49-F238E27FC236}">
-                <a16:creationId xmlns:a16="http://schemas.microsoft.com/office/drawing/2014/main" id="{FF430FC3-7DC9-4CF2-B24E-0787C027CE87}"/>
+                <a16:creationId xmlns:a16="http://schemas.microsoft.com/office/drawing/2014/main" id="{0512F9CB-A1A0-4043-A103-F6A4B94B695A}"/>
+              </a:ext>
+              <a:ext uri="{C183D7F6-B498-43B3-948B-1728B52AA6E4}">
+                <adec:decorative xmlns:adec="http://schemas.microsoft.com/office/drawing/2017/decorative" val="1"/>
               </a:ext>
             </a:extLst>
           </p:cNvPr>
-          <p:cNvGraphicFramePr>
-            <a:graphicFrameLocks noGrp="1"/>
-          </p:cNvGraphicFramePr>
+          <p:cNvCxnSpPr>
+            <a:cxnSpLocks noGrp="1" noRot="1" noChangeAspect="1" noMove="1" noResize="1" noEditPoints="1" noAdjustHandles="1" noChangeArrowheads="1" noChangeShapeType="1"/>
+          </p:cNvCxnSpPr>
+          <p:nvPr>
+            <p:extLst>
+              <p:ext uri="{386F3935-93C4-4BCD-93E2-E3B085C9AB24}">
+                <p16:designElem xmlns:p16="http://schemas.microsoft.com/office/powerpoint/2015/main" val="1"/>
+              </p:ext>
+            </p:extLst>
+          </p:nvPr>
+        </p:nvCxnSpPr>
+        <p:spPr>
+          <a:xfrm flipH="1">
+            <a:off x="8228012" y="8467"/>
+            <a:ext cx="3810000" cy="3810000"/>
+          </a:xfrm>
+          <a:prstGeom prst="line">
+            <a:avLst/>
+          </a:prstGeom>
+          <a:ln w="12700">
+            <a:solidFill>
+              <a:schemeClr val="tx1"/>
+            </a:solidFill>
+          </a:ln>
+        </p:spPr>
+        <p:style>
+          <a:lnRef idx="2">
+            <a:schemeClr val="accent1"/>
+          </a:lnRef>
+          <a:fillRef idx="0">
+            <a:schemeClr val="accent1"/>
+          </a:fillRef>
+          <a:effectRef idx="1">
+            <a:schemeClr val="accent1"/>
+          </a:effectRef>
+          <a:fontRef idx="minor">
+            <a:schemeClr val="tx1"/>
+          </a:fontRef>
+        </p:style>
+      </p:cxnSp>
+      <p:cxnSp>
+        <p:nvCxnSpPr>
+          <p:cNvPr id="12" name="Straight Connector 11">
+            <a:extLst>
+              <a:ext uri="{FF2B5EF4-FFF2-40B4-BE49-F238E27FC236}">
+                <a16:creationId xmlns:a16="http://schemas.microsoft.com/office/drawing/2014/main" id="{ADBE6588-EE16-4389-857C-86A156D49E5D}"/>
+              </a:ext>
+              <a:ext uri="{C183D7F6-B498-43B3-948B-1728B52AA6E4}">
+                <adec:decorative xmlns:adec="http://schemas.microsoft.com/office/drawing/2017/decorative" val="1"/>
+              </a:ext>
+            </a:extLst>
+          </p:cNvPr>
+          <p:cNvCxnSpPr>
+            <a:cxnSpLocks noGrp="1" noRot="1" noChangeAspect="1" noMove="1" noResize="1" noEditPoints="1" noAdjustHandles="1" noChangeArrowheads="1" noChangeShapeType="1"/>
+          </p:cNvCxnSpPr>
+          <p:nvPr>
+            <p:extLst>
+              <p:ext uri="{386F3935-93C4-4BCD-93E2-E3B085C9AB24}">
+                <p16:designElem xmlns:p16="http://schemas.microsoft.com/office/powerpoint/2015/main" val="1"/>
+              </p:ext>
+            </p:extLst>
+          </p:nvPr>
+        </p:nvCxnSpPr>
+        <p:spPr>
+          <a:xfrm flipH="1">
+            <a:off x="6108170" y="91545"/>
+            <a:ext cx="6080655" cy="6080655"/>
+          </a:xfrm>
+          <a:prstGeom prst="line">
+            <a:avLst/>
+          </a:prstGeom>
+          <a:ln w="12700">
+            <a:solidFill>
+              <a:schemeClr val="tx1"/>
+            </a:solidFill>
+          </a:ln>
+        </p:spPr>
+        <p:style>
+          <a:lnRef idx="2">
+            <a:schemeClr val="accent1"/>
+          </a:lnRef>
+          <a:fillRef idx="0">
+            <a:schemeClr val="accent1"/>
+          </a:fillRef>
+          <a:effectRef idx="1">
+            <a:schemeClr val="accent1"/>
+          </a:effectRef>
+          <a:fontRef idx="minor">
+            <a:schemeClr val="tx1"/>
+          </a:fontRef>
+        </p:style>
+      </p:cxnSp>
+      <p:cxnSp>
+        <p:nvCxnSpPr>
+          <p:cNvPr id="14" name="Straight Connector 13">
+            <a:extLst>
+              <a:ext uri="{FF2B5EF4-FFF2-40B4-BE49-F238E27FC236}">
+                <a16:creationId xmlns:a16="http://schemas.microsoft.com/office/drawing/2014/main" id="{17FD48D2-B0A7-413D-B947-AA55AC1296D5}"/>
+              </a:ext>
+              <a:ext uri="{C183D7F6-B498-43B3-948B-1728B52AA6E4}">
+                <adec:decorative xmlns:adec="http://schemas.microsoft.com/office/drawing/2017/decorative" val="1"/>
+              </a:ext>
+            </a:extLst>
+          </p:cNvPr>
+          <p:cNvCxnSpPr>
+            <a:cxnSpLocks noGrp="1" noRot="1" noChangeAspect="1" noMove="1" noResize="1" noEditPoints="1" noAdjustHandles="1" noChangeArrowheads="1" noChangeShapeType="1"/>
+          </p:cNvCxnSpPr>
+          <p:nvPr>
+            <p:extLst>
+              <p:ext uri="{386F3935-93C4-4BCD-93E2-E3B085C9AB24}">
+                <p16:designElem xmlns:p16="http://schemas.microsoft.com/office/powerpoint/2015/main" val="1"/>
+              </p:ext>
+            </p:extLst>
+          </p:nvPr>
+        </p:nvCxnSpPr>
+        <p:spPr>
+          <a:xfrm flipH="1">
+            <a:off x="7235825" y="228600"/>
+            <a:ext cx="4953000" cy="4953000"/>
+          </a:xfrm>
+          <a:prstGeom prst="line">
+            <a:avLst/>
+          </a:prstGeom>
+          <a:ln w="12700">
+            <a:solidFill>
+              <a:schemeClr val="tx1"/>
+            </a:solidFill>
+          </a:ln>
+        </p:spPr>
+        <p:style>
+          <a:lnRef idx="2">
+            <a:schemeClr val="accent1"/>
+          </a:lnRef>
+          <a:fillRef idx="0">
+            <a:schemeClr val="accent1"/>
+          </a:fillRef>
+          <a:effectRef idx="1">
+            <a:schemeClr val="accent1"/>
+          </a:effectRef>
+          <a:fontRef idx="minor">
+            <a:schemeClr val="tx1"/>
+          </a:fontRef>
+        </p:style>
+      </p:cxnSp>
+      <p:cxnSp>
+        <p:nvCxnSpPr>
+          <p:cNvPr id="16" name="Straight Connector 15">
+            <a:extLst>
+              <a:ext uri="{FF2B5EF4-FFF2-40B4-BE49-F238E27FC236}">
+                <a16:creationId xmlns:a16="http://schemas.microsoft.com/office/drawing/2014/main" id="{2BE668D0-D906-4EEE-B32F-8C028624B837}"/>
+              </a:ext>
+              <a:ext uri="{C183D7F6-B498-43B3-948B-1728B52AA6E4}">
+                <adec:decorative xmlns:adec="http://schemas.microsoft.com/office/drawing/2017/decorative" val="1"/>
+              </a:ext>
+            </a:extLst>
+          </p:cNvPr>
+          <p:cNvCxnSpPr>
+            <a:cxnSpLocks noGrp="1" noRot="1" noChangeAspect="1" noMove="1" noResize="1" noEditPoints="1" noAdjustHandles="1" noChangeArrowheads="1" noChangeShapeType="1"/>
+          </p:cNvCxnSpPr>
+          <p:nvPr>
+            <p:extLst>
+              <p:ext uri="{386F3935-93C4-4BCD-93E2-E3B085C9AB24}">
+                <p16:designElem xmlns:p16="http://schemas.microsoft.com/office/powerpoint/2015/main" val="1"/>
+              </p:ext>
+            </p:extLst>
+          </p:nvPr>
+        </p:nvCxnSpPr>
+        <p:spPr>
+          <a:xfrm flipH="1">
+            <a:off x="7335837" y="32278"/>
+            <a:ext cx="4852989" cy="4852989"/>
+          </a:xfrm>
+          <a:prstGeom prst="line">
+            <a:avLst/>
+          </a:prstGeom>
+          <a:ln w="31750">
+            <a:solidFill>
+              <a:schemeClr val="tx1"/>
+            </a:solidFill>
+          </a:ln>
+        </p:spPr>
+        <p:style>
+          <a:lnRef idx="2">
+            <a:schemeClr val="accent1"/>
+          </a:lnRef>
+          <a:fillRef idx="0">
+            <a:schemeClr val="accent1"/>
+          </a:fillRef>
+          <a:effectRef idx="1">
+            <a:schemeClr val="accent1"/>
+          </a:effectRef>
+          <a:fontRef idx="minor">
+            <a:schemeClr val="tx1"/>
+          </a:fontRef>
+        </p:style>
+      </p:cxnSp>
+      <p:cxnSp>
+        <p:nvCxnSpPr>
+          <p:cNvPr id="18" name="Straight Connector 17">
+            <a:extLst>
+              <a:ext uri="{FF2B5EF4-FFF2-40B4-BE49-F238E27FC236}">
+                <a16:creationId xmlns:a16="http://schemas.microsoft.com/office/drawing/2014/main" id="{D1DE67A3-B8F6-4CFD-A8E0-D15200F23152}"/>
+              </a:ext>
+              <a:ext uri="{C183D7F6-B498-43B3-948B-1728B52AA6E4}">
+                <adec:decorative xmlns:adec="http://schemas.microsoft.com/office/drawing/2017/decorative" val="1"/>
+              </a:ext>
+            </a:extLst>
+          </p:cNvPr>
+          <p:cNvCxnSpPr>
+            <a:cxnSpLocks noGrp="1" noRot="1" noChangeAspect="1" noMove="1" noResize="1" noEditPoints="1" noAdjustHandles="1" noChangeArrowheads="1" noChangeShapeType="1"/>
+          </p:cNvCxnSpPr>
+          <p:nvPr>
+            <p:extLst>
+              <p:ext uri="{386F3935-93C4-4BCD-93E2-E3B085C9AB24}">
+                <p16:designElem xmlns:p16="http://schemas.microsoft.com/office/powerpoint/2015/main" val="1"/>
+              </p:ext>
+            </p:extLst>
+          </p:nvPr>
+        </p:nvCxnSpPr>
+        <p:spPr>
+          <a:xfrm flipH="1">
+            <a:off x="7845426" y="609601"/>
+            <a:ext cx="4343399" cy="4343399"/>
+          </a:xfrm>
+          <a:prstGeom prst="line">
+            <a:avLst/>
+          </a:prstGeom>
+          <a:ln w="31750">
+            <a:solidFill>
+              <a:schemeClr val="tx1"/>
+            </a:solidFill>
+          </a:ln>
+        </p:spPr>
+        <p:style>
+          <a:lnRef idx="2">
+            <a:schemeClr val="accent1"/>
+          </a:lnRef>
+          <a:fillRef idx="0">
+            <a:schemeClr val="accent1"/>
+          </a:fillRef>
+          <a:effectRef idx="1">
+            <a:schemeClr val="accent1"/>
+          </a:effectRef>
+          <a:fontRef idx="minor">
+            <a:schemeClr val="tx1"/>
+          </a:fontRef>
+        </p:style>
+      </p:cxnSp>
+      <p:sp>
+        <p:nvSpPr>
+          <p:cNvPr id="20" name="Rectangle 19">
+            <a:extLst>
+              <a:ext uri="{FF2B5EF4-FFF2-40B4-BE49-F238E27FC236}">
+                <a16:creationId xmlns:a16="http://schemas.microsoft.com/office/drawing/2014/main" id="{6DCB64DE-FB3A-4D83-9241-A0D26824BE54}"/>
+              </a:ext>
+              <a:ext uri="{C183D7F6-B498-43B3-948B-1728B52AA6E4}">
+                <adec:decorative xmlns:adec="http://schemas.microsoft.com/office/drawing/2017/decorative" val="1"/>
+              </a:ext>
+            </a:extLst>
+          </p:cNvPr>
+          <p:cNvSpPr>
+            <a:spLocks noGrp="1" noRot="1" noChangeAspect="1" noMove="1" noResize="1" noEditPoints="1" noAdjustHandles="1" noChangeArrowheads="1" noChangeShapeType="1" noTextEdit="1"/>
+          </p:cNvSpPr>
+          <p:nvPr>
+            <p:extLst>
+              <p:ext uri="{386F3935-93C4-4BCD-93E2-E3B085C9AB24}">
+                <p16:designElem xmlns:p16="http://schemas.microsoft.com/office/powerpoint/2015/main" val="1"/>
+              </p:ext>
+            </p:extLst>
+          </p:nvPr>
+        </p:nvSpPr>
+        <p:spPr>
+          <a:xfrm>
+            <a:off x="0" y="0"/>
+            <a:ext cx="12192000" cy="6858000"/>
+          </a:xfrm>
+          <a:prstGeom prst="rect">
+            <a:avLst/>
+          </a:prstGeom>
+          <a:ln>
+            <a:noFill/>
+          </a:ln>
+        </p:spPr>
+        <p:style>
+          <a:lnRef idx="2">
+            <a:schemeClr val="accent1">
+              <a:shade val="50000"/>
+            </a:schemeClr>
+          </a:lnRef>
+          <a:fillRef idx="1002">
+            <a:schemeClr val="dk2"/>
+          </a:fillRef>
+          <a:effectRef idx="0">
+            <a:schemeClr val="accent1"/>
+          </a:effectRef>
+          <a:fontRef idx="minor">
+            <a:schemeClr val="lt1"/>
+          </a:fontRef>
+        </p:style>
+        <p:txBody>
+          <a:bodyPr rtlCol="0" anchor="ctr"/>
+          <a:lstStyle/>
+          <a:p>
+            <a:pPr algn="ctr"/>
+            <a:endParaRPr lang="en-US"/>
+          </a:p>
+        </p:txBody>
+      </p:sp>
+      <p:sp>
+        <p:nvSpPr>
+          <p:cNvPr id="2" name="Title 1">
+            <a:extLst>
+              <a:ext uri="{FF2B5EF4-FFF2-40B4-BE49-F238E27FC236}">
+                <a16:creationId xmlns:a16="http://schemas.microsoft.com/office/drawing/2014/main" id="{E3F566FB-1D9C-4FF3-8851-F6EFDBAD2F85}"/>
+              </a:ext>
+            </a:extLst>
+          </p:cNvPr>
+          <p:cNvSpPr>
+            <a:spLocks noGrp="1"/>
+          </p:cNvSpPr>
+          <p:nvPr>
+            <p:ph type="title"/>
+          </p:nvPr>
+        </p:nvSpPr>
+        <p:spPr>
+          <a:xfrm>
+            <a:off x="665640" y="4414687"/>
+            <a:ext cx="10250013" cy="1233251"/>
+          </a:xfrm>
+        </p:spPr>
+        <p:txBody>
+          <a:bodyPr vert="horz" lIns="91440" tIns="45720" rIns="91440" bIns="45720" rtlCol="0" anchor="b">
+            <a:normAutofit/>
+          </a:bodyPr>
+          <a:lstStyle/>
+          <a:p>
+            <a:pPr>
+              <a:lnSpc>
+                <a:spcPct val="90000"/>
+              </a:lnSpc>
+            </a:pPr>
+            <a:r>
+              <a:rPr lang="en-US" sz="4100">
+                <a:solidFill>
+                  <a:srgbClr val="FFFFFF"/>
+                </a:solidFill>
+              </a:rPr>
+              <a:t>Concordance correlation coefficient &amp; CCC LOSS</a:t>
+            </a:r>
+            <a:endParaRPr lang="en-US" sz="4100" dirty="0">
+              <a:solidFill>
+                <a:srgbClr val="FFFFFF"/>
+              </a:solidFill>
+            </a:endParaRPr>
+          </a:p>
+        </p:txBody>
+      </p:sp>
+      <p:sp useBgFill="1">
+        <p:nvSpPr>
+          <p:cNvPr id="22" name="Snip Diagonal Corner Rectangle 6">
+            <a:extLst>
+              <a:ext uri="{FF2B5EF4-FFF2-40B4-BE49-F238E27FC236}">
+                <a16:creationId xmlns:a16="http://schemas.microsoft.com/office/drawing/2014/main" id="{5E94C64B-831C-45FA-B484-591F4D577C60}"/>
+              </a:ext>
+              <a:ext uri="{C183D7F6-B498-43B3-948B-1728B52AA6E4}">
+                <adec:decorative xmlns:adec="http://schemas.microsoft.com/office/drawing/2017/decorative" val="1"/>
+              </a:ext>
+            </a:extLst>
+          </p:cNvPr>
+          <p:cNvSpPr>
+            <a:spLocks noGrp="1" noRot="1" noChangeAspect="1" noMove="1" noResize="1" noEditPoints="1" noAdjustHandles="1" noChangeArrowheads="1" noChangeShapeType="1" noTextEdit="1"/>
+          </p:cNvSpPr>
+          <p:nvPr>
+            <p:extLst>
+              <p:ext uri="{386F3935-93C4-4BCD-93E2-E3B085C9AB24}">
+                <p16:designElem xmlns:p16="http://schemas.microsoft.com/office/powerpoint/2015/main" val="1"/>
+              </p:ext>
+            </p:extLst>
+          </p:nvPr>
+        </p:nvSpPr>
+        <p:spPr>
+          <a:xfrm>
+            <a:off x="605702" y="606367"/>
+            <a:ext cx="10948124" cy="3546637"/>
+          </a:xfrm>
+          <a:prstGeom prst="snip2DiagRect">
+            <a:avLst>
+              <a:gd name="adj1" fmla="val 13628"/>
+              <a:gd name="adj2" fmla="val 0"/>
+            </a:avLst>
+          </a:prstGeom>
+          <a:ln>
+            <a:noFill/>
+          </a:ln>
+          <a:effectLst>
+            <a:innerShdw blurRad="57150" dist="38100" dir="14460000">
+              <a:prstClr val="black">
+                <a:alpha val="70000"/>
+              </a:prstClr>
+            </a:innerShdw>
+          </a:effectLst>
+        </p:spPr>
+        <p:style>
+          <a:lnRef idx="2">
+            <a:schemeClr val="accent1">
+              <a:shade val="50000"/>
+            </a:schemeClr>
+          </a:lnRef>
+          <a:fillRef idx="1">
+            <a:schemeClr val="accent1"/>
+          </a:fillRef>
+          <a:effectRef idx="0">
+            <a:schemeClr val="accent1"/>
+          </a:effectRef>
+          <a:fontRef idx="minor">
+            <a:schemeClr val="lt1"/>
+          </a:fontRef>
+        </p:style>
+        <p:txBody>
+          <a:bodyPr rtlCol="0" anchor="ctr"/>
+          <a:lstStyle/>
+          <a:p>
+            <a:pPr algn="ctr"/>
+            <a:endParaRPr lang="en-US"/>
+          </a:p>
+        </p:txBody>
+      </p:sp>
+      <p:pic>
+        <p:nvPicPr>
+          <p:cNvPr id="5" name="Content Placeholder 4">
+            <a:extLst>
+              <a:ext uri="{FF2B5EF4-FFF2-40B4-BE49-F238E27FC236}">
+                <a16:creationId xmlns:a16="http://schemas.microsoft.com/office/drawing/2014/main" id="{4F2C2D29-91D1-4EDB-94E4-34C87F7DAD60}"/>
+              </a:ext>
+            </a:extLst>
+          </p:cNvPr>
+          <p:cNvPicPr>
+            <a:picLocks noGrp="1" noChangeAspect="1"/>
+          </p:cNvPicPr>
           <p:nvPr>
             <p:ph idx="1"/>
           </p:nvPr>
-        </p:nvGraphicFramePr>
-        <p:xfrm>
-          <a:off x="259702" y="3765415"/>
-          <a:ext cx="11672596" cy="2933965"/>
-        </p:xfrm>
-        <a:graphic>
-          <a:graphicData uri="http://schemas.openxmlformats.org/drawingml/2006/diagram">
-            <dgm:relIds xmlns:dgm="http://schemas.openxmlformats.org/drawingml/2006/diagram" xmlns:r="http://schemas.openxmlformats.org/officeDocument/2006/relationships" r:dm="rId3" r:lo="rId4" r:qs="rId5" r:cs="rId6"/>
-          </a:graphicData>
-        </a:graphic>
-      </p:graphicFrame>
+        </p:nvPicPr>
+        <p:blipFill>
+          <a:blip r:embed="rId3"/>
+          <a:stretch>
+            <a:fillRect/>
+          </a:stretch>
+        </p:blipFill>
+        <p:spPr>
+          <a:xfrm>
+            <a:off x="1106739" y="816974"/>
+            <a:ext cx="9940660" cy="2559720"/>
+          </a:xfrm>
+          <a:prstGeom prst="rect">
+            <a:avLst/>
+          </a:prstGeom>
+        </p:spPr>
+      </p:pic>
+      <p:grpSp>
+        <p:nvGrpSpPr>
+          <p:cNvPr id="24" name="Group 23">
+            <a:extLst>
+              <a:ext uri="{FF2B5EF4-FFF2-40B4-BE49-F238E27FC236}">
+                <a16:creationId xmlns:a16="http://schemas.microsoft.com/office/drawing/2014/main" id="{AC96E397-7705-43C9-AC81-FA8EF1951DD2}"/>
+              </a:ext>
+              <a:ext uri="{C183D7F6-B498-43B3-948B-1728B52AA6E4}">
+                <adec:decorative xmlns:adec="http://schemas.microsoft.com/office/drawing/2017/decorative" val="1"/>
+              </a:ext>
+            </a:extLst>
+          </p:cNvPr>
+          <p:cNvGrpSpPr>
+            <a:grpSpLocks noGrp="1" noUngrp="1" noRot="1" noChangeAspect="1" noMove="1" noResize="1"/>
+          </p:cNvGrpSpPr>
+          <p:nvPr>
+            <p:extLst>
+              <p:ext uri="{386F3935-93C4-4BCD-93E2-E3B085C9AB24}">
+                <p16:designElem xmlns:p16="http://schemas.microsoft.com/office/powerpoint/2015/main" val="1"/>
+              </p:ext>
+            </p:extLst>
+          </p:nvPr>
+        </p:nvGrpSpPr>
+        <p:grpSpPr>
+          <a:xfrm>
+            <a:off x="9206969" y="2963333"/>
+            <a:ext cx="2981858" cy="3208867"/>
+            <a:chOff x="9206969" y="2963333"/>
+            <a:chExt cx="2981858" cy="3208867"/>
+          </a:xfrm>
+        </p:grpSpPr>
+        <p:cxnSp>
+          <p:nvCxnSpPr>
+            <p:cNvPr id="25" name="Straight Connector 24">
+              <a:extLst>
+                <a:ext uri="{FF2B5EF4-FFF2-40B4-BE49-F238E27FC236}">
+                  <a16:creationId xmlns:a16="http://schemas.microsoft.com/office/drawing/2014/main" id="{F3610BCA-0EBE-4357-AAC0-13841E7C54F3}"/>
+                </a:ext>
+                <a:ext uri="{C183D7F6-B498-43B3-948B-1728B52AA6E4}">
+                  <adec:decorative xmlns:adec="http://schemas.microsoft.com/office/drawing/2017/decorative" val="1"/>
+                </a:ext>
+              </a:extLst>
+            </p:cNvPr>
+            <p:cNvCxnSpPr/>
+            <p:nvPr>
+              <p:extLst>
+                <p:ext uri="{386F3935-93C4-4BCD-93E2-E3B085C9AB24}">
+                  <p16:designElem xmlns:p16="http://schemas.microsoft.com/office/powerpoint/2015/main" val="1"/>
+                </p:ext>
+              </p:extLst>
+            </p:nvPr>
+          </p:nvCxnSpPr>
+          <p:spPr>
+            <a:xfrm flipH="1">
+              <a:off x="11276012" y="2963333"/>
+              <a:ext cx="912814" cy="912812"/>
+            </a:xfrm>
+            <a:prstGeom prst="line">
+              <a:avLst/>
+            </a:prstGeom>
+            <a:ln w="9525">
+              <a:solidFill>
+                <a:srgbClr val="FFFFFF"/>
+              </a:solidFill>
+            </a:ln>
+          </p:spPr>
+          <p:style>
+            <a:lnRef idx="2">
+              <a:schemeClr val="accent1"/>
+            </a:lnRef>
+            <a:fillRef idx="0">
+              <a:schemeClr val="accent1"/>
+            </a:fillRef>
+            <a:effectRef idx="1">
+              <a:schemeClr val="accent1"/>
+            </a:effectRef>
+            <a:fontRef idx="minor">
+              <a:schemeClr val="tx1"/>
+            </a:fontRef>
+          </p:style>
+        </p:cxnSp>
+        <p:cxnSp>
+          <p:nvCxnSpPr>
+            <p:cNvPr id="26" name="Straight Connector 25">
+              <a:extLst>
+                <a:ext uri="{FF2B5EF4-FFF2-40B4-BE49-F238E27FC236}">
+                  <a16:creationId xmlns:a16="http://schemas.microsoft.com/office/drawing/2014/main" id="{B60E1E24-3D98-4A53-A3AD-CBD84D94FA29}"/>
+                </a:ext>
+                <a:ext uri="{C183D7F6-B498-43B3-948B-1728B52AA6E4}">
+                  <adec:decorative xmlns:adec="http://schemas.microsoft.com/office/drawing/2017/decorative" val="1"/>
+                </a:ext>
+              </a:extLst>
+            </p:cNvPr>
+            <p:cNvCxnSpPr/>
+            <p:nvPr>
+              <p:extLst>
+                <p:ext uri="{386F3935-93C4-4BCD-93E2-E3B085C9AB24}">
+                  <p16:designElem xmlns:p16="http://schemas.microsoft.com/office/powerpoint/2015/main" val="1"/>
+                </p:ext>
+              </p:extLst>
+            </p:nvPr>
+          </p:nvCxnSpPr>
+          <p:spPr>
+            <a:xfrm flipH="1">
+              <a:off x="9206969" y="3190344"/>
+              <a:ext cx="2981857" cy="2981856"/>
+            </a:xfrm>
+            <a:prstGeom prst="line">
+              <a:avLst/>
+            </a:prstGeom>
+            <a:ln w="9525">
+              <a:solidFill>
+                <a:srgbClr val="FFFFFF"/>
+              </a:solidFill>
+            </a:ln>
+          </p:spPr>
+          <p:style>
+            <a:lnRef idx="2">
+              <a:schemeClr val="accent1"/>
+            </a:lnRef>
+            <a:fillRef idx="0">
+              <a:schemeClr val="accent1"/>
+            </a:fillRef>
+            <a:effectRef idx="1">
+              <a:schemeClr val="accent1"/>
+            </a:effectRef>
+            <a:fontRef idx="minor">
+              <a:schemeClr val="tx1"/>
+            </a:fontRef>
+          </p:style>
+        </p:cxnSp>
+        <p:cxnSp>
+          <p:nvCxnSpPr>
+            <p:cNvPr id="27" name="Straight Connector 26">
+              <a:extLst>
+                <a:ext uri="{FF2B5EF4-FFF2-40B4-BE49-F238E27FC236}">
+                  <a16:creationId xmlns:a16="http://schemas.microsoft.com/office/drawing/2014/main" id="{367E51D9-454B-4095-9718-C6B1CDED9737}"/>
+                </a:ext>
+                <a:ext uri="{C183D7F6-B498-43B3-948B-1728B52AA6E4}">
+                  <adec:decorative xmlns:adec="http://schemas.microsoft.com/office/drawing/2017/decorative" val="1"/>
+                </a:ext>
+              </a:extLst>
+            </p:cNvPr>
+            <p:cNvCxnSpPr/>
+            <p:nvPr>
+              <p:extLst>
+                <p:ext uri="{386F3935-93C4-4BCD-93E2-E3B085C9AB24}">
+                  <p16:designElem xmlns:p16="http://schemas.microsoft.com/office/powerpoint/2015/main" val="1"/>
+                </p:ext>
+              </p:extLst>
+            </p:nvPr>
+          </p:nvCxnSpPr>
+          <p:spPr>
+            <a:xfrm flipH="1">
+              <a:off x="10292292" y="3285067"/>
+              <a:ext cx="1896534" cy="1896533"/>
+            </a:xfrm>
+            <a:prstGeom prst="line">
+              <a:avLst/>
+            </a:prstGeom>
+            <a:ln w="9525">
+              <a:solidFill>
+                <a:srgbClr val="FFFFFF"/>
+              </a:solidFill>
+            </a:ln>
+          </p:spPr>
+          <p:style>
+            <a:lnRef idx="2">
+              <a:schemeClr val="accent1"/>
+            </a:lnRef>
+            <a:fillRef idx="0">
+              <a:schemeClr val="accent1"/>
+            </a:fillRef>
+            <a:effectRef idx="1">
+              <a:schemeClr val="accent1"/>
+            </a:effectRef>
+            <a:fontRef idx="minor">
+              <a:schemeClr val="tx1"/>
+            </a:fontRef>
+          </p:style>
+        </p:cxnSp>
+        <p:cxnSp>
+          <p:nvCxnSpPr>
+            <p:cNvPr id="28" name="Straight Connector 27">
+              <a:extLst>
+                <a:ext uri="{FF2B5EF4-FFF2-40B4-BE49-F238E27FC236}">
+                  <a16:creationId xmlns:a16="http://schemas.microsoft.com/office/drawing/2014/main" id="{4A8E8BDB-294C-4025-A6C1-2FFDDA36F869}"/>
+                </a:ext>
+                <a:ext uri="{C183D7F6-B498-43B3-948B-1728B52AA6E4}">
+                  <adec:decorative xmlns:adec="http://schemas.microsoft.com/office/drawing/2017/decorative" val="1"/>
+                </a:ext>
+              </a:extLst>
+            </p:cNvPr>
+            <p:cNvCxnSpPr/>
+            <p:nvPr>
+              <p:extLst>
+                <p:ext uri="{386F3935-93C4-4BCD-93E2-E3B085C9AB24}">
+                  <p16:designElem xmlns:p16="http://schemas.microsoft.com/office/powerpoint/2015/main" val="1"/>
+                </p:ext>
+              </p:extLst>
+            </p:nvPr>
+          </p:nvCxnSpPr>
+          <p:spPr>
+            <a:xfrm flipH="1">
+              <a:off x="10443103" y="3131080"/>
+              <a:ext cx="1745722" cy="1745720"/>
+            </a:xfrm>
+            <a:prstGeom prst="line">
+              <a:avLst/>
+            </a:prstGeom>
+            <a:ln w="28575">
+              <a:solidFill>
+                <a:srgbClr val="FFFFFF"/>
+              </a:solidFill>
+            </a:ln>
+          </p:spPr>
+          <p:style>
+            <a:lnRef idx="2">
+              <a:schemeClr val="accent1"/>
+            </a:lnRef>
+            <a:fillRef idx="0">
+              <a:schemeClr val="accent1"/>
+            </a:fillRef>
+            <a:effectRef idx="1">
+              <a:schemeClr val="accent1"/>
+            </a:effectRef>
+            <a:fontRef idx="minor">
+              <a:schemeClr val="tx1"/>
+            </a:fontRef>
+          </p:style>
+        </p:cxnSp>
+        <p:cxnSp>
+          <p:nvCxnSpPr>
+            <p:cNvPr id="29" name="Straight Connector 28">
+              <a:extLst>
+                <a:ext uri="{FF2B5EF4-FFF2-40B4-BE49-F238E27FC236}">
+                  <a16:creationId xmlns:a16="http://schemas.microsoft.com/office/drawing/2014/main" id="{A0D27BDE-F887-4341-B91A-3145A6142EC7}"/>
+                </a:ext>
+                <a:ext uri="{C183D7F6-B498-43B3-948B-1728B52AA6E4}">
+                  <adec:decorative xmlns:adec="http://schemas.microsoft.com/office/drawing/2017/decorative" val="1"/>
+                </a:ext>
+              </a:extLst>
+            </p:cNvPr>
+            <p:cNvCxnSpPr/>
+            <p:nvPr>
+              <p:extLst>
+                <p:ext uri="{386F3935-93C4-4BCD-93E2-E3B085C9AB24}">
+                  <p16:designElem xmlns:p16="http://schemas.microsoft.com/office/powerpoint/2015/main" val="1"/>
+                </p:ext>
+              </p:extLst>
+            </p:nvPr>
+          </p:nvCxnSpPr>
+          <p:spPr>
+            <a:xfrm flipH="1">
+              <a:off x="10918826" y="3683001"/>
+              <a:ext cx="1270001" cy="1269999"/>
+            </a:xfrm>
+            <a:prstGeom prst="line">
+              <a:avLst/>
+            </a:prstGeom>
+            <a:ln w="28575">
+              <a:solidFill>
+                <a:srgbClr val="FFFFFF"/>
+              </a:solidFill>
+            </a:ln>
+          </p:spPr>
+          <p:style>
+            <a:lnRef idx="2">
+              <a:schemeClr val="accent1"/>
+            </a:lnRef>
+            <a:fillRef idx="0">
+              <a:schemeClr val="accent1"/>
+            </a:fillRef>
+            <a:effectRef idx="1">
+              <a:schemeClr val="accent1"/>
+            </a:effectRef>
+            <a:fontRef idx="minor">
+              <a:schemeClr val="tx1"/>
+            </a:fontRef>
+          </p:style>
+        </p:cxnSp>
+      </p:grpSp>
       <p:pic>
         <p:nvPicPr>
-          <p:cNvPr id="3" name="Picture 2">
+          <p:cNvPr id="7" name="Picture 6">
             <a:extLst>
               <a:ext uri="{FF2B5EF4-FFF2-40B4-BE49-F238E27FC236}">
-                <a16:creationId xmlns:a16="http://schemas.microsoft.com/office/drawing/2014/main" id="{AE55D0E7-DD41-4EC3-8A2C-8D7EC4E170DE}"/>
+                <a16:creationId xmlns:a16="http://schemas.microsoft.com/office/drawing/2014/main" id="{92C8AE6B-F560-41D2-854F-B0FDA54B1FD3}"/>
               </a:ext>
             </a:extLst>
           </p:cNvPr>
@@ -16563,15 +17441,15 @@
           <p:nvPr/>
         </p:nvPicPr>
         <p:blipFill>
-          <a:blip r:embed="rId8"/>
+          <a:blip r:embed="rId4"/>
           <a:stretch>
             <a:fillRect/>
           </a:stretch>
         </p:blipFill>
         <p:spPr>
           <a:xfrm>
-            <a:off x="1175459" y="76667"/>
-            <a:ext cx="9841081" cy="4161609"/>
+            <a:off x="3751736" y="3078092"/>
+            <a:ext cx="4706007" cy="676369"/>
           </a:xfrm>
           <a:prstGeom prst="rect">
             <a:avLst/>
@@ -16581,12 +17459,12 @@
     </p:spTree>
     <p:extLst>
       <p:ext uri="{BB962C8B-B14F-4D97-AF65-F5344CB8AC3E}">
-        <p14:creationId xmlns:p14="http://schemas.microsoft.com/office/powerpoint/2010/main" val="3809881936"/>
+        <p14:creationId xmlns:p14="http://schemas.microsoft.com/office/powerpoint/2010/main" val="2598260990"/>
       </p:ext>
     </p:extLst>
   </p:cSld>
   <p:clrMapOvr>
-    <a:masterClrMapping/>
+    <a:overrideClrMapping bg1="lt1" tx1="dk1" bg2="lt2" tx2="dk2" accent1="accent1" accent2="accent2" accent3="accent3" accent4="accent4" accent5="accent5" accent6="accent6" hlink="hlink" folHlink="folHlink"/>
   </p:clrMapOvr>
 </p:sld>
 </file>

</xml_diff>

<commit_message>
Presentation out of repo
</commit_message>
<xml_diff>
--- a/report/Presentation.pptx
+++ b/report/Presentation.pptx
@@ -5,7 +5,7 @@
     <p:sldMasterId id="2147483660" r:id="rId1"/>
   </p:sldMasterIdLst>
   <p:notesMasterIdLst>
-    <p:notesMasterId r:id="rId12"/>
+    <p:notesMasterId r:id="rId13"/>
   </p:notesMasterIdLst>
   <p:sldIdLst>
     <p:sldId id="257" r:id="rId2"/>
@@ -18,6 +18,7 @@
     <p:sldId id="256" r:id="rId9"/>
     <p:sldId id="266" r:id="rId10"/>
     <p:sldId id="263" r:id="rId11"/>
+    <p:sldId id="267" r:id="rId12"/>
   </p:sldIdLst>
   <p:sldSz cx="12192000" cy="6858000"/>
   <p:notesSz cx="6858000" cy="9144000"/>
@@ -119,6 +120,9 @@
   <p:extLst>
     <p:ext uri="{EFAFB233-063F-42B5-8137-9DF3F51BA10A}">
       <p15:sldGuideLst xmlns:p15="http://schemas.microsoft.com/office/powerpoint/2012/main"/>
+    </p:ext>
+    <p:ext uri="{2D200454-40CA-4A62-9FC3-DE9A4176ACB9}">
+      <p15:notesGuideLst xmlns:p15="http://schemas.microsoft.com/office/powerpoint/2012/main"/>
     </p:ext>
   </p:extLst>
 </p:presentation>
@@ -6303,6 +6307,177 @@
 </p:notes>
 </file>
 
+<file path=ppt/notesSlides/notesSlide10.xml><?xml version="1.0" encoding="utf-8"?>
+<p:notes xmlns:a="http://schemas.openxmlformats.org/drawingml/2006/main" xmlns:r="http://schemas.openxmlformats.org/officeDocument/2006/relationships" xmlns:p="http://schemas.openxmlformats.org/presentationml/2006/main">
+  <p:cSld>
+    <p:spTree>
+      <p:nvGrpSpPr>
+        <p:cNvPr id="1" name=""/>
+        <p:cNvGrpSpPr/>
+        <p:nvPr/>
+      </p:nvGrpSpPr>
+      <p:grpSpPr>
+        <a:xfrm>
+          <a:off x="0" y="0"/>
+          <a:ext cx="0" cy="0"/>
+          <a:chOff x="0" y="0"/>
+          <a:chExt cx="0" cy="0"/>
+        </a:xfrm>
+      </p:grpSpPr>
+      <p:sp>
+        <p:nvSpPr>
+          <p:cNvPr id="2" name="Slide Image Placeholder 1"/>
+          <p:cNvSpPr>
+            <a:spLocks noGrp="1" noRot="1" noChangeAspect="1"/>
+          </p:cNvSpPr>
+          <p:nvPr>
+            <p:ph type="sldImg"/>
+          </p:nvPr>
+        </p:nvSpPr>
+        <p:spPr/>
+      </p:sp>
+      <p:sp>
+        <p:nvSpPr>
+          <p:cNvPr id="3" name="Notes Placeholder 2"/>
+          <p:cNvSpPr>
+            <a:spLocks noGrp="1"/>
+          </p:cNvSpPr>
+          <p:nvPr>
+            <p:ph type="body" idx="1"/>
+          </p:nvPr>
+        </p:nvSpPr>
+        <p:spPr/>
+        <p:txBody>
+          <a:bodyPr/>
+          <a:lstStyle/>
+          <a:p>
+            <a:r>
+              <a:rPr lang="en-US" dirty="0"/>
+              <a:t>Counterintuitive results are caused from a specific case of hyperparameter optimization along with the used datasets</a:t>
+            </a:r>
+          </a:p>
+        </p:txBody>
+      </p:sp>
+      <p:sp>
+        <p:nvSpPr>
+          <p:cNvPr id="4" name="Slide Number Placeholder 3"/>
+          <p:cNvSpPr>
+            <a:spLocks noGrp="1"/>
+          </p:cNvSpPr>
+          <p:nvPr>
+            <p:ph type="sldNum" sz="quarter" idx="5"/>
+          </p:nvPr>
+        </p:nvSpPr>
+        <p:spPr/>
+        <p:txBody>
+          <a:bodyPr/>
+          <a:lstStyle/>
+          <a:p>
+            <a:fld id="{14AC118C-48E1-4114-9041-6A465FDC6B30}" type="slidenum">
+              <a:rPr lang="en-US" smtClean="0"/>
+              <a:t>10</a:t>
+            </a:fld>
+            <a:endParaRPr lang="en-US"/>
+          </a:p>
+        </p:txBody>
+      </p:sp>
+    </p:spTree>
+    <p:extLst>
+      <p:ext uri="{BB962C8B-B14F-4D97-AF65-F5344CB8AC3E}">
+        <p14:creationId xmlns:p14="http://schemas.microsoft.com/office/powerpoint/2010/main" val="739134558"/>
+      </p:ext>
+    </p:extLst>
+  </p:cSld>
+  <p:clrMapOvr>
+    <a:masterClrMapping/>
+  </p:clrMapOvr>
+</p:notes>
+</file>
+
+<file path=ppt/notesSlides/notesSlide11.xml><?xml version="1.0" encoding="utf-8"?>
+<p:notes xmlns:a="http://schemas.openxmlformats.org/drawingml/2006/main" xmlns:r="http://schemas.openxmlformats.org/officeDocument/2006/relationships" xmlns:p="http://schemas.openxmlformats.org/presentationml/2006/main">
+  <p:cSld>
+    <p:spTree>
+      <p:nvGrpSpPr>
+        <p:cNvPr id="1" name=""/>
+        <p:cNvGrpSpPr/>
+        <p:nvPr/>
+      </p:nvGrpSpPr>
+      <p:grpSpPr>
+        <a:xfrm>
+          <a:off x="0" y="0"/>
+          <a:ext cx="0" cy="0"/>
+          <a:chOff x="0" y="0"/>
+          <a:chExt cx="0" cy="0"/>
+        </a:xfrm>
+      </p:grpSpPr>
+      <p:sp>
+        <p:nvSpPr>
+          <p:cNvPr id="2" name="Slide Image Placeholder 1"/>
+          <p:cNvSpPr>
+            <a:spLocks noGrp="1" noRot="1" noChangeAspect="1"/>
+          </p:cNvSpPr>
+          <p:nvPr>
+            <p:ph type="sldImg"/>
+          </p:nvPr>
+        </p:nvSpPr>
+        <p:spPr/>
+      </p:sp>
+      <p:sp>
+        <p:nvSpPr>
+          <p:cNvPr id="3" name="Notes Placeholder 2"/>
+          <p:cNvSpPr>
+            <a:spLocks noGrp="1"/>
+          </p:cNvSpPr>
+          <p:nvPr>
+            <p:ph type="body" idx="1"/>
+          </p:nvPr>
+        </p:nvSpPr>
+        <p:spPr/>
+        <p:txBody>
+          <a:bodyPr/>
+          <a:lstStyle/>
+          <a:p>
+            <a:endParaRPr lang="en-US" dirty="0"/>
+          </a:p>
+        </p:txBody>
+      </p:sp>
+      <p:sp>
+        <p:nvSpPr>
+          <p:cNvPr id="4" name="Slide Number Placeholder 3"/>
+          <p:cNvSpPr>
+            <a:spLocks noGrp="1"/>
+          </p:cNvSpPr>
+          <p:nvPr>
+            <p:ph type="sldNum" sz="quarter" idx="5"/>
+          </p:nvPr>
+        </p:nvSpPr>
+        <p:spPr/>
+        <p:txBody>
+          <a:bodyPr/>
+          <a:lstStyle/>
+          <a:p>
+            <a:fld id="{14AC118C-48E1-4114-9041-6A465FDC6B30}" type="slidenum">
+              <a:rPr lang="en-US" smtClean="0"/>
+              <a:t>11</a:t>
+            </a:fld>
+            <a:endParaRPr lang="en-US"/>
+          </a:p>
+        </p:txBody>
+      </p:sp>
+    </p:spTree>
+    <p:extLst>
+      <p:ext uri="{BB962C8B-B14F-4D97-AF65-F5344CB8AC3E}">
+        <p14:creationId xmlns:p14="http://schemas.microsoft.com/office/powerpoint/2010/main" val="380748379"/>
+      </p:ext>
+    </p:extLst>
+  </p:cSld>
+  <p:clrMapOvr>
+    <a:masterClrMapping/>
+  </p:clrMapOvr>
+</p:notes>
+</file>
+
 <file path=ppt/notesSlides/notesSlide2.xml><?xml version="1.0" encoding="utf-8"?>
 <p:notes xmlns:a="http://schemas.openxmlformats.org/drawingml/2006/main" xmlns:r="http://schemas.openxmlformats.org/officeDocument/2006/relationships" xmlns:p="http://schemas.openxmlformats.org/presentationml/2006/main">
   <p:cSld>
@@ -6547,24 +6722,8 @@
           <a:p>
             <a:r>
               <a:rPr lang="en-US" dirty="0"/>
-              <a:t>2 databases are utilized in this study.</a:t>
+              <a:t>Below you see the benchmark models and above you see the proposed architecture</a:t>
             </a:r>
-            <a:br>
-              <a:rPr lang="en-US" dirty="0"/>
-            </a:br>
-            <a:r>
-              <a:rPr lang="en-US" dirty="0"/>
-              <a:t>MSP : dyadic interactions staged by 12 actors</a:t>
-            </a:r>
-          </a:p>
-          <a:p>
-            <a:r>
-              <a:rPr lang="en-US" dirty="0"/>
-              <a:t>Although both datasets include extra data such as video and text, only audio data was utilized.</a:t>
-            </a:r>
-          </a:p>
-          <a:p>
-            <a:endParaRPr lang="en-US" dirty="0"/>
           </a:p>
         </p:txBody>
       </p:sp>
@@ -6585,7 +6744,7 @@
           <a:p>
             <a:fld id="{14AC118C-48E1-4114-9041-6A465FDC6B30}" type="slidenum">
               <a:rPr lang="en-US" smtClean="0"/>
-              <a:t>5</a:t>
+              <a:t>4</a:t>
             </a:fld>
             <a:endParaRPr lang="en-US"/>
           </a:p>
@@ -6594,7 +6753,7 @@
     </p:spTree>
     <p:extLst>
       <p:ext uri="{BB962C8B-B14F-4D97-AF65-F5344CB8AC3E}">
-        <p14:creationId xmlns:p14="http://schemas.microsoft.com/office/powerpoint/2010/main" val="2513792306"/>
+        <p14:creationId xmlns:p14="http://schemas.microsoft.com/office/powerpoint/2010/main" val="356015440"/>
       </p:ext>
     </p:extLst>
   </p:cSld>
@@ -6650,57 +6809,30 @@
           <a:p>
             <a:r>
               <a:rPr lang="en-US" dirty="0"/>
-              <a:t>This table shows the </a:t>
-            </a:r>
-            <a:r>
-              <a:rPr lang="en-US" dirty="0" err="1"/>
-              <a:t>GeMAPS</a:t>
-            </a:r>
-            <a:r>
-              <a:rPr lang="en-US" dirty="0"/>
-              <a:t> features utilized in the study. </a:t>
-            </a:r>
-          </a:p>
-          <a:p>
-            <a:r>
-              <a:rPr lang="en-US" dirty="0"/>
-              <a:t>There seems to be 20 features but one feature is actually composed of 4 components, here there are 4 MFCCs</a:t>
-            </a:r>
-          </a:p>
-          <a:p>
-            <a:r>
-              <a:rPr lang="en-US" dirty="0"/>
-              <a:t>These low level descriptors are extracted from the data resulting in nodes dimension of nodes </a:t>
-            </a:r>
-            <a:r>
-              <a:rPr lang="en-US" b="1" i="0" dirty="0">
-                <a:solidFill>
-                  <a:srgbClr val="BDC1C6"/>
-                </a:solidFill>
-                <a:effectLst/>
-                <a:latin typeface="arial" panose="020B0604020202020204" pitchFamily="34" charset="0"/>
-              </a:rPr>
-              <a:t>(3409 × 23)</a:t>
+              <a:t>2 databases are utilized in this study.</a:t>
             </a:r>
             <a:br>
-              <a:rPr lang="en-US" b="1" i="0" dirty="0">
-                <a:solidFill>
-                  <a:srgbClr val="BDC1C6"/>
-                </a:solidFill>
-                <a:effectLst/>
-                <a:latin typeface="arial" panose="020B0604020202020204" pitchFamily="34" charset="0"/>
-              </a:rPr>
+              <a:rPr lang="en-US" dirty="0"/>
             </a:br>
             <a:r>
               <a:rPr lang="en-US" dirty="0"/>
-              <a:t>along the larger dimension mean and standard deviation are calculated to obtain 46 features. In addition authors defined a new feature</a:t>
+              <a:t>MSP : dyadic interactions staged by 12 actors</a:t>
             </a:r>
           </a:p>
           <a:p>
             <a:r>
               <a:rPr lang="en-US" dirty="0"/>
-              <a:t>The silence is obtained as the ratio of silent frames by the number of total frames. </a:t>
+              <a:t>Although both datasets include extra data such as video and text, only audio data was utilized. </a:t>
             </a:r>
+          </a:p>
+          <a:p>
+            <a:r>
+              <a:rPr lang="en-US" dirty="0"/>
+              <a:t>Labelled by multiple annotators</a:t>
+            </a:r>
+          </a:p>
+          <a:p>
+            <a:endParaRPr lang="en-US" dirty="0"/>
           </a:p>
         </p:txBody>
       </p:sp>
@@ -6721,7 +6853,7 @@
           <a:p>
             <a:fld id="{14AC118C-48E1-4114-9041-6A465FDC6B30}" type="slidenum">
               <a:rPr lang="en-US" smtClean="0"/>
-              <a:t>6</a:t>
+              <a:t>5</a:t>
             </a:fld>
             <a:endParaRPr lang="en-US"/>
           </a:p>
@@ -6730,7 +6862,7 @@
     </p:spTree>
     <p:extLst>
       <p:ext uri="{BB962C8B-B14F-4D97-AF65-F5344CB8AC3E}">
-        <p14:creationId xmlns:p14="http://schemas.microsoft.com/office/powerpoint/2010/main" val="797548539"/>
+        <p14:creationId xmlns:p14="http://schemas.microsoft.com/office/powerpoint/2010/main" val="2513792306"/>
       </p:ext>
     </p:extLst>
   </p:cSld>
@@ -6784,7 +6916,59 @@
           <a:bodyPr/>
           <a:lstStyle/>
           <a:p>
-            <a:endParaRPr lang="en-US" dirty="0"/>
+            <a:r>
+              <a:rPr lang="en-US" dirty="0"/>
+              <a:t>This table shows the </a:t>
+            </a:r>
+            <a:r>
+              <a:rPr lang="en-US" dirty="0" err="1"/>
+              <a:t>GeMAPS</a:t>
+            </a:r>
+            <a:r>
+              <a:rPr lang="en-US" dirty="0"/>
+              <a:t> features utilized in the study. </a:t>
+            </a:r>
+          </a:p>
+          <a:p>
+            <a:r>
+              <a:rPr lang="en-US" dirty="0"/>
+              <a:t>There seems to be 20 features but one feature is actually composed of 4 components, here there are 4 MFCCs</a:t>
+            </a:r>
+          </a:p>
+          <a:p>
+            <a:r>
+              <a:rPr lang="en-US" dirty="0"/>
+              <a:t>These low level descriptors are extracted from the data resulting in nodes dimension of nodes </a:t>
+            </a:r>
+            <a:r>
+              <a:rPr lang="en-US" b="1" i="0" dirty="0">
+                <a:solidFill>
+                  <a:srgbClr val="BDC1C6"/>
+                </a:solidFill>
+                <a:effectLst/>
+                <a:latin typeface="arial" panose="020B0604020202020204" pitchFamily="34" charset="0"/>
+              </a:rPr>
+              <a:t>(3409 × 23)</a:t>
+            </a:r>
+            <a:br>
+              <a:rPr lang="en-US" b="1" i="0" dirty="0">
+                <a:solidFill>
+                  <a:srgbClr val="BDC1C6"/>
+                </a:solidFill>
+                <a:effectLst/>
+                <a:latin typeface="arial" panose="020B0604020202020204" pitchFamily="34" charset="0"/>
+              </a:rPr>
+            </a:br>
+            <a:r>
+              <a:rPr lang="en-US" dirty="0"/>
+              <a:t>along the larger dimension mean and standard deviation are calculated to obtain 46 features. In addition authors defined a new feature</a:t>
+            </a:r>
+          </a:p>
+          <a:p>
+            <a:r>
+              <a:rPr lang="en-US" dirty="0"/>
+              <a:t>The silence is obtained as the ratio of silent frames by the number of total frames. </a:t>
+            </a:r>
           </a:p>
         </p:txBody>
       </p:sp>
@@ -6805,7 +6989,7 @@
           <a:p>
             <a:fld id="{14AC118C-48E1-4114-9041-6A465FDC6B30}" type="slidenum">
               <a:rPr lang="en-US" smtClean="0"/>
-              <a:t>7</a:t>
+              <a:t>6</a:t>
             </a:fld>
             <a:endParaRPr lang="en-US"/>
           </a:p>
@@ -6814,7 +6998,7 @@
     </p:spTree>
     <p:extLst>
       <p:ext uri="{BB962C8B-B14F-4D97-AF65-F5344CB8AC3E}">
-        <p14:creationId xmlns:p14="http://schemas.microsoft.com/office/powerpoint/2010/main" val="4107807388"/>
+        <p14:creationId xmlns:p14="http://schemas.microsoft.com/office/powerpoint/2010/main" val="797548539"/>
       </p:ext>
     </p:extLst>
   </p:cSld>
@@ -6868,7 +7052,33 @@
           <a:bodyPr/>
           <a:lstStyle/>
           <a:p>
+            <a:r>
+              <a:rPr lang="en-US" dirty="0"/>
+              <a:t>Utilized only training and test sets </a:t>
+            </a:r>
+          </a:p>
+          <a:p>
+            <a:r>
+              <a:rPr lang="en-US" dirty="0"/>
+              <a:t>There were categorical labels, converted it to dimensional based on the table that I showed before</a:t>
+            </a:r>
+          </a:p>
+          <a:p>
+            <a:r>
+              <a:rPr lang="en-US" dirty="0"/>
+              <a:t>There were labels annotated “neutral” in this dataset, after dropping them I am left with approximately 5 </a:t>
+            </a:r>
+            <a:r>
+              <a:rPr lang="en-US"/>
+              <a:t>thousand samples.</a:t>
+            </a:r>
             <a:endParaRPr lang="en-US" dirty="0"/>
+          </a:p>
+          <a:p>
+            <a:r>
+              <a:rPr lang="en-US" dirty="0"/>
+              <a:t>Added 0.01 to reflect the effect of human bias to the labels just one times</a:t>
+            </a:r>
           </a:p>
         </p:txBody>
       </p:sp>
@@ -6889,7 +7099,7 @@
           <a:p>
             <a:fld id="{14AC118C-48E1-4114-9041-6A465FDC6B30}" type="slidenum">
               <a:rPr lang="en-US" smtClean="0"/>
-              <a:t>9</a:t>
+              <a:t>7</a:t>
             </a:fld>
             <a:endParaRPr lang="en-US"/>
           </a:p>
@@ -6898,7 +7108,7 @@
     </p:spTree>
     <p:extLst>
       <p:ext uri="{BB962C8B-B14F-4D97-AF65-F5344CB8AC3E}">
-        <p14:creationId xmlns:p14="http://schemas.microsoft.com/office/powerpoint/2010/main" val="3039124653"/>
+        <p14:creationId xmlns:p14="http://schemas.microsoft.com/office/powerpoint/2010/main" val="4107807388"/>
       </p:ext>
     </p:extLst>
   </p:cSld>
@@ -6952,7 +7162,7 @@
           <a:bodyPr/>
           <a:lstStyle/>
           <a:p>
-            <a:endParaRPr lang="en-US" dirty="0"/>
+            <a:endParaRPr lang="en-US"/>
           </a:p>
         </p:txBody>
       </p:sp>
@@ -6973,7 +7183,7 @@
           <a:p>
             <a:fld id="{14AC118C-48E1-4114-9041-6A465FDC6B30}" type="slidenum">
               <a:rPr lang="en-US" smtClean="0"/>
-              <a:t>10</a:t>
+              <a:t>8</a:t>
             </a:fld>
             <a:endParaRPr lang="en-US"/>
           </a:p>
@@ -6982,7 +7192,112 @@
     </p:spTree>
     <p:extLst>
       <p:ext uri="{BB962C8B-B14F-4D97-AF65-F5344CB8AC3E}">
-        <p14:creationId xmlns:p14="http://schemas.microsoft.com/office/powerpoint/2010/main" val="739134558"/>
+        <p14:creationId xmlns:p14="http://schemas.microsoft.com/office/powerpoint/2010/main" val="3359053310"/>
+      </p:ext>
+    </p:extLst>
+  </p:cSld>
+  <p:clrMapOvr>
+    <a:masterClrMapping/>
+  </p:clrMapOvr>
+</p:notes>
+</file>
+
+<file path=ppt/notesSlides/notesSlide9.xml><?xml version="1.0" encoding="utf-8"?>
+<p:notes xmlns:a="http://schemas.openxmlformats.org/drawingml/2006/main" xmlns:r="http://schemas.openxmlformats.org/officeDocument/2006/relationships" xmlns:p="http://schemas.openxmlformats.org/presentationml/2006/main">
+  <p:cSld>
+    <p:spTree>
+      <p:nvGrpSpPr>
+        <p:cNvPr id="1" name=""/>
+        <p:cNvGrpSpPr/>
+        <p:nvPr/>
+      </p:nvGrpSpPr>
+      <p:grpSpPr>
+        <a:xfrm>
+          <a:off x="0" y="0"/>
+          <a:ext cx="0" cy="0"/>
+          <a:chOff x="0" y="0"/>
+          <a:chExt cx="0" cy="0"/>
+        </a:xfrm>
+      </p:grpSpPr>
+      <p:sp>
+        <p:nvSpPr>
+          <p:cNvPr id="2" name="Slide Image Placeholder 1"/>
+          <p:cNvSpPr>
+            <a:spLocks noGrp="1" noRot="1" noChangeAspect="1"/>
+          </p:cNvSpPr>
+          <p:nvPr>
+            <p:ph type="sldImg"/>
+          </p:nvPr>
+        </p:nvSpPr>
+        <p:spPr/>
+      </p:sp>
+      <p:sp>
+        <p:nvSpPr>
+          <p:cNvPr id="3" name="Notes Placeholder 2"/>
+          <p:cNvSpPr>
+            <a:spLocks noGrp="1"/>
+          </p:cNvSpPr>
+          <p:nvPr>
+            <p:ph type="body" idx="1"/>
+          </p:nvPr>
+        </p:nvSpPr>
+        <p:spPr/>
+        <p:txBody>
+          <a:bodyPr/>
+          <a:lstStyle/>
+          <a:p>
+            <a:r>
+              <a:rPr lang="en-US" dirty="0" err="1"/>
+              <a:t>Pearsons</a:t>
+            </a:r>
+            <a:endParaRPr lang="en-US" dirty="0"/>
+          </a:p>
+          <a:p>
+            <a:r>
+              <a:rPr lang="en-US" dirty="0"/>
+              <a:t>Loss definition is intuitive</a:t>
+            </a:r>
+          </a:p>
+          <a:p>
+            <a:r>
+              <a:rPr lang="en-US" dirty="0"/>
+              <a:t>Used MSE loss for MLPs due to scikit implementation of </a:t>
+            </a:r>
+            <a:r>
+              <a:rPr lang="en-US" dirty="0" err="1"/>
+              <a:t>MLPRregressor</a:t>
+            </a:r>
+            <a:endParaRPr lang="en-US" dirty="0"/>
+          </a:p>
+        </p:txBody>
+      </p:sp>
+      <p:sp>
+        <p:nvSpPr>
+          <p:cNvPr id="4" name="Slide Number Placeholder 3"/>
+          <p:cNvSpPr>
+            <a:spLocks noGrp="1"/>
+          </p:cNvSpPr>
+          <p:nvPr>
+            <p:ph type="sldNum" sz="quarter" idx="5"/>
+          </p:nvPr>
+        </p:nvSpPr>
+        <p:spPr/>
+        <p:txBody>
+          <a:bodyPr/>
+          <a:lstStyle/>
+          <a:p>
+            <a:fld id="{14AC118C-48E1-4114-9041-6A465FDC6B30}" type="slidenum">
+              <a:rPr lang="en-US" smtClean="0"/>
+              <a:t>9</a:t>
+            </a:fld>
+            <a:endParaRPr lang="en-US"/>
+          </a:p>
+        </p:txBody>
+      </p:sp>
+    </p:spTree>
+    <p:extLst>
+      <p:ext uri="{BB962C8B-B14F-4D97-AF65-F5344CB8AC3E}">
+        <p14:creationId xmlns:p14="http://schemas.microsoft.com/office/powerpoint/2010/main" val="3039124653"/>
       </p:ext>
     </p:extLst>
   </p:cSld>
@@ -12328,17 +12643,20 @@
         </p:nvSpPr>
         <p:spPr>
           <a:xfrm>
-            <a:off x="622068" y="2337047"/>
-            <a:ext cx="8534400" cy="3615267"/>
+            <a:off x="622068" y="2337048"/>
+            <a:ext cx="8534400" cy="1714092"/>
           </a:xfrm>
         </p:spPr>
         <p:txBody>
           <a:bodyPr/>
           <a:lstStyle/>
           <a:p>
+            <a:pPr marL="0" indent="0">
+              <a:buNone/>
+            </a:pPr>
             <a:r>
               <a:rPr lang="en-US" dirty="0"/>
-              <a:t>Kutay Uğurlu</a:t>
+              <a:t>											Kutay Uğurlu</a:t>
             </a:r>
           </a:p>
         </p:txBody>
@@ -12433,6 +12751,79 @@
     <p:extLst>
       <p:ext uri="{BB962C8B-B14F-4D97-AF65-F5344CB8AC3E}">
         <p14:creationId xmlns:p14="http://schemas.microsoft.com/office/powerpoint/2010/main" val="3809881936"/>
+      </p:ext>
+    </p:extLst>
+  </p:cSld>
+  <p:clrMapOvr>
+    <a:masterClrMapping/>
+  </p:clrMapOvr>
+</p:sld>
+</file>
+
+<file path=ppt/slides/slide11.xml><?xml version="1.0" encoding="utf-8"?>
+<p:sld xmlns:a="http://schemas.openxmlformats.org/drawingml/2006/main" xmlns:r="http://schemas.openxmlformats.org/officeDocument/2006/relationships" xmlns:p="http://schemas.openxmlformats.org/presentationml/2006/main">
+  <p:cSld>
+    <p:spTree>
+      <p:nvGrpSpPr>
+        <p:cNvPr id="1" name=""/>
+        <p:cNvGrpSpPr/>
+        <p:nvPr/>
+      </p:nvGrpSpPr>
+      <p:grpSpPr>
+        <a:xfrm>
+          <a:off x="0" y="0"/>
+          <a:ext cx="0" cy="0"/>
+          <a:chOff x="0" y="0"/>
+          <a:chExt cx="0" cy="0"/>
+        </a:xfrm>
+      </p:grpSpPr>
+      <p:sp>
+        <p:nvSpPr>
+          <p:cNvPr id="3" name="Content Placeholder 2">
+            <a:extLst>
+              <a:ext uri="{FF2B5EF4-FFF2-40B4-BE49-F238E27FC236}">
+                <a16:creationId xmlns:a16="http://schemas.microsoft.com/office/drawing/2014/main" id="{D5D12BDF-ABA4-4B1D-945C-1831DA43F07A}"/>
+              </a:ext>
+            </a:extLst>
+          </p:cNvPr>
+          <p:cNvSpPr>
+            <a:spLocks noGrp="1"/>
+          </p:cNvSpPr>
+          <p:nvPr>
+            <p:ph idx="1"/>
+          </p:nvPr>
+        </p:nvSpPr>
+        <p:spPr>
+          <a:xfrm>
+            <a:off x="-334360" y="1621366"/>
+            <a:ext cx="8534400" cy="3615267"/>
+          </a:xfrm>
+        </p:spPr>
+        <p:txBody>
+          <a:bodyPr>
+            <a:normAutofit/>
+          </a:bodyPr>
+          <a:lstStyle/>
+          <a:p>
+            <a:pPr marL="0" indent="0" algn="ctr">
+              <a:buNone/>
+            </a:pPr>
+            <a:r>
+              <a:rPr lang="en-US" sz="7200" dirty="0">
+                <a:solidFill>
+                  <a:schemeClr val="tx1"/>
+                </a:solidFill>
+              </a:rPr>
+              <a:t>Thanks....</a:t>
+            </a:r>
+            <a:endParaRPr lang="en-US" sz="7200" dirty="0"/>
+          </a:p>
+        </p:txBody>
+      </p:sp>
+    </p:spTree>
+    <p:extLst>
+      <p:ext uri="{BB962C8B-B14F-4D97-AF65-F5344CB8AC3E}">
+        <p14:creationId xmlns:p14="http://schemas.microsoft.com/office/powerpoint/2010/main" val="3869070353"/>
       </p:ext>
     </p:extLst>
   </p:cSld>
@@ -12929,8 +13320,8 @@
         </p:blipFill>
         <p:spPr>
           <a:xfrm>
-            <a:off x="792480" y="1659826"/>
-            <a:ext cx="10607040" cy="3208629"/>
+            <a:off x="792480" y="1792465"/>
+            <a:ext cx="10607040" cy="2935323"/>
           </a:xfrm>
           <a:custGeom>
             <a:avLst/>
@@ -13783,7 +14174,7 @@
           <a:p>
             <a:r>
               <a:rPr lang="en-US" dirty="0"/>
-              <a:t>ARCITECTURES</a:t>
+              <a:t>ARCHITECTURES</a:t>
             </a:r>
           </a:p>
         </p:txBody>
@@ -13873,7 +14264,7 @@
           <p:nvPr/>
         </p:nvPicPr>
         <p:blipFill>
-          <a:blip r:embed="rId2">
+          <a:blip r:embed="rId3">
             <a:extLst>
               <a:ext uri="{28A0092B-C50C-407E-A947-70E740481C1C}">
                 <a14:useLocalDpi xmlns:a14="http://schemas.microsoft.com/office/drawing/2010/main" val="0"/>
@@ -13909,7 +14300,7 @@
           <p:nvPr/>
         </p:nvPicPr>
         <p:blipFill>
-          <a:blip r:embed="rId3">
+          <a:blip r:embed="rId4">
             <a:extLst>
               <a:ext uri="{28A0092B-C50C-407E-A947-70E740481C1C}">
                 <a14:useLocalDpi xmlns:a14="http://schemas.microsoft.com/office/drawing/2010/main" val="0"/>
@@ -16101,6 +16492,42 @@
           </a:p>
         </p:txBody>
       </p:sp>
+      <p:pic>
+        <p:nvPicPr>
+          <p:cNvPr id="21" name="Content Placeholder 3" descr="Table&#10;&#10;Description automatically generated">
+            <a:extLst>
+              <a:ext uri="{FF2B5EF4-FFF2-40B4-BE49-F238E27FC236}">
+                <a16:creationId xmlns:a16="http://schemas.microsoft.com/office/drawing/2014/main" id="{D0D647AF-B93C-4355-9636-EB3992C882F7}"/>
+              </a:ext>
+            </a:extLst>
+          </p:cNvPr>
+          <p:cNvPicPr>
+            <a:picLocks noChangeAspect="1"/>
+          </p:cNvPicPr>
+          <p:nvPr/>
+        </p:nvPicPr>
+        <p:blipFill>
+          <a:blip r:embed="rId4">
+            <a:extLst>
+              <a:ext uri="{28A0092B-C50C-407E-A947-70E740481C1C}">
+                <a14:useLocalDpi xmlns:a14="http://schemas.microsoft.com/office/drawing/2010/main" val="0"/>
+              </a:ext>
+            </a:extLst>
+          </a:blip>
+          <a:stretch>
+            <a:fillRect/>
+          </a:stretch>
+        </p:blipFill>
+        <p:spPr>
+          <a:xfrm>
+            <a:off x="7652869" y="3796434"/>
+            <a:ext cx="3479800" cy="2296194"/>
+          </a:xfrm>
+          <a:prstGeom prst="rect">
+            <a:avLst/>
+          </a:prstGeom>
+        </p:spPr>
+      </p:pic>
     </p:spTree>
     <p:extLst>
       <p:ext uri="{BB962C8B-B14F-4D97-AF65-F5344CB8AC3E}">
@@ -16294,7 +16721,7 @@
           <p:nvPr/>
         </p:nvPicPr>
         <p:blipFill>
-          <a:blip r:embed="rId2">
+          <a:blip r:embed="rId3">
             <a:extLst>
               <a:ext uri="{28A0092B-C50C-407E-A947-70E740481C1C}">
                 <a14:useLocalDpi xmlns:a14="http://schemas.microsoft.com/office/drawing/2010/main" val="0"/>
@@ -16330,7 +16757,7 @@
           <p:nvPr/>
         </p:nvPicPr>
         <p:blipFill>
-          <a:blip r:embed="rId3">
+          <a:blip r:embed="rId4">
             <a:extLst>
               <a:ext uri="{28A0092B-C50C-407E-A947-70E740481C1C}">
                 <a14:useLocalDpi xmlns:a14="http://schemas.microsoft.com/office/drawing/2010/main" val="0"/>
@@ -16366,7 +16793,7 @@
           <p:nvPr/>
         </p:nvPicPr>
         <p:blipFill>
-          <a:blip r:embed="rId4">
+          <a:blip r:embed="rId5">
             <a:extLst>
               <a:ext uri="{28A0092B-C50C-407E-A947-70E740481C1C}">
                 <a14:useLocalDpi xmlns:a14="http://schemas.microsoft.com/office/drawing/2010/main" val="0"/>
@@ -16614,7 +17041,7 @@
           <p:nvPr/>
         </p:nvPicPr>
         <p:blipFill>
-          <a:blip r:embed="rId5">
+          <a:blip r:embed="rId6">
             <a:extLst>
               <a:ext uri="{28A0092B-C50C-407E-A947-70E740481C1C}">
                 <a14:useLocalDpi xmlns:a14="http://schemas.microsoft.com/office/drawing/2010/main" val="0"/>

</xml_diff>